<commit_message>
Tweaks and fixes to presentation.
</commit_message>
<xml_diff>
--- a/presentations/codesharing_2014-10.pptx
+++ b/presentations/codesharing_2014-10.pptx
@@ -43,7 +43,6 @@
     <p:sldId id="287" r:id="rId36"/>
     <p:sldId id="288" r:id="rId37"/>
     <p:sldId id="289" r:id="rId38"/>
-    <p:sldId id="290" r:id="rId39"/>
   </p:sldIdLst>
   <p:sldSz cx="10080625" cy="7559675"/>
   <p:notesSz cx="7772400" cy="10058400"/>
@@ -219,7 +218,7 @@
           <a:bodyPr lIns="0" rIns="0" tIns="0" bIns="0" anchor="b"/>
           <a:p>
             <a:pPr algn="r"/>
-            <a:fld id="{8AC28CD3-783B-429E-BE8B-80AFBD26BB28}" type="slidenum">
+            <a:fld id="{77B714B0-AF34-4A66-9B40-A3648D9C3006}" type="slidenum">
               <a:rPr lang="en-CA" sz="1400">
                 <a:latin typeface="Times New Roman"/>
               </a:rPr>
@@ -254,7 +253,7 @@
       </p:grpSpPr>
       <p:sp>
         <p:nvSpPr>
-          <p:cNvPr id="155" name="PlaceHolder 1"/>
+          <p:cNvPr id="153" name="PlaceHolder 1"/>
           <p:cNvSpPr>
             <a:spLocks noGrp="1"/>
           </p:cNvSpPr>
@@ -332,7 +331,7 @@
       </p:grpSpPr>
       <p:sp>
         <p:nvSpPr>
-          <p:cNvPr id="156" name="PlaceHolder 1"/>
+          <p:cNvPr id="154" name="PlaceHolder 1"/>
           <p:cNvSpPr>
             <a:spLocks noGrp="1"/>
           </p:cNvSpPr>
@@ -2922,7 +2921,7 @@
           <a:bodyPr lIns="0" rIns="0" tIns="0" bIns="0"/>
           <a:p>
             <a:pPr algn="r"/>
-            <a:fld id="{5317DE7D-470A-4325-A80A-7D7AB15E8933}" type="slidenum">
+            <a:fld id="{EC9BE947-E5BE-413E-8871-7A68247E6639}" type="slidenum">
               <a:rPr lang="en-CA" sz="1400">
                 <a:latin typeface="Times New Roman"/>
               </a:rPr>
@@ -3235,7 +3234,7 @@
           <a:bodyPr lIns="0" rIns="0" tIns="0" bIns="0"/>
           <a:p>
             <a:pPr algn="r"/>
-            <a:fld id="{36054519-3B52-4C7D-9D86-62647EE7F8FF}" type="slidenum">
+            <a:fld id="{9ECE76E2-7DAA-493B-9BF3-DC6B45AFC3E9}" type="slidenum">
               <a:rPr lang="en-CA" sz="1400">
                 <a:latin typeface="Times New Roman"/>
               </a:rPr>
@@ -3500,10 +3499,10 @@
   <p:timing>
     <p:tnLst>
       <p:par>
-        <p:cTn id="35" dur="indefinite" restart="never" nodeType="tmRoot">
+        <p:cTn id="63" dur="indefinite" restart="never" nodeType="tmRoot">
           <p:childTnLst>
             <p:seq>
-              <p:cTn id="36" nodeType="mainSeq"/>
+              <p:cTn id="64" nodeType="mainSeq"/>
               <p:prevCondLst>
                 <p:cond delay="0" evt="onPrev">
                   <p:tgtEl>
@@ -3602,10 +3601,10 @@
   <p:timing>
     <p:tnLst>
       <p:par>
-        <p:cTn id="37" dur="indefinite" restart="never" nodeType="tmRoot">
+        <p:cTn id="65" dur="indefinite" restart="never" nodeType="tmRoot">
           <p:childTnLst>
             <p:seq>
-              <p:cTn id="38" nodeType="mainSeq"/>
+              <p:cTn id="66" nodeType="mainSeq"/>
               <p:prevCondLst>
                 <p:cond delay="0" evt="onPrev">
                   <p:tgtEl>
@@ -3745,10 +3744,10 @@
   <p:timing>
     <p:tnLst>
       <p:par>
-        <p:cTn id="39" dur="indefinite" restart="never" nodeType="tmRoot">
+        <p:cTn id="67" dur="indefinite" restart="never" nodeType="tmRoot">
           <p:childTnLst>
             <p:seq>
-              <p:cTn id="40" nodeType="mainSeq"/>
+              <p:cTn id="68" nodeType="mainSeq"/>
               <p:prevCondLst>
                 <p:cond delay="0" evt="onPrev">
                   <p:tgtEl>
@@ -3847,10 +3846,10 @@
   <p:timing>
     <p:tnLst>
       <p:par>
-        <p:cTn id="41" dur="indefinite" restart="never" nodeType="tmRoot">
+        <p:cTn id="69" dur="indefinite" restart="never" nodeType="tmRoot">
           <p:childTnLst>
             <p:seq>
-              <p:cTn id="42" nodeType="mainSeq"/>
+              <p:cTn id="70" nodeType="mainSeq"/>
               <p:prevCondLst>
                 <p:cond delay="0" evt="onPrev">
                   <p:tgtEl>
@@ -3949,10 +3948,10 @@
   <p:timing>
     <p:tnLst>
       <p:par>
-        <p:cTn id="43" dur="indefinite" restart="never" nodeType="tmRoot">
+        <p:cTn id="71" dur="indefinite" restart="never" nodeType="tmRoot">
           <p:childTnLst>
             <p:seq>
-              <p:cTn id="44" nodeType="mainSeq"/>
+              <p:cTn id="72" nodeType="mainSeq"/>
               <p:prevCondLst>
                 <p:cond delay="0" evt="onPrev">
                   <p:tgtEl>
@@ -4051,10 +4050,10 @@
   <p:timing>
     <p:tnLst>
       <p:par>
-        <p:cTn id="45" dur="indefinite" restart="never" nodeType="tmRoot">
+        <p:cTn id="73" dur="indefinite" restart="never" nodeType="tmRoot">
           <p:childTnLst>
             <p:seq>
-              <p:cTn id="46" nodeType="mainSeq"/>
+              <p:cTn id="74" nodeType="mainSeq"/>
               <p:prevCondLst>
                 <p:cond delay="0" evt="onPrev">
                   <p:tgtEl>
@@ -4153,10 +4152,10 @@
   <p:timing>
     <p:tnLst>
       <p:par>
-        <p:cTn id="47" dur="indefinite" restart="never" nodeType="tmRoot">
+        <p:cTn id="75" dur="indefinite" restart="never" nodeType="tmRoot">
           <p:childTnLst>
             <p:seq>
-              <p:cTn id="48" nodeType="mainSeq"/>
+              <p:cTn id="76" nodeType="mainSeq"/>
               <p:prevCondLst>
                 <p:cond delay="0" evt="onPrev">
                   <p:tgtEl>
@@ -4255,10 +4254,10 @@
   <p:timing>
     <p:tnLst>
       <p:par>
-        <p:cTn id="49" dur="indefinite" restart="never" nodeType="tmRoot">
+        <p:cTn id="77" dur="indefinite" restart="never" nodeType="tmRoot">
           <p:childTnLst>
             <p:seq>
-              <p:cTn id="50" nodeType="mainSeq"/>
+              <p:cTn id="78" nodeType="mainSeq"/>
               <p:prevCondLst>
                 <p:cond delay="0" evt="onPrev">
                   <p:tgtEl>
@@ -4357,10 +4356,10 @@
   <p:timing>
     <p:tnLst>
       <p:par>
-        <p:cTn id="51" dur="indefinite" restart="never" nodeType="tmRoot">
+        <p:cTn id="79" dur="indefinite" restart="never" nodeType="tmRoot">
           <p:childTnLst>
             <p:seq>
-              <p:cTn id="52" nodeType="mainSeq"/>
+              <p:cTn id="80" nodeType="mainSeq"/>
               <p:prevCondLst>
                 <p:cond delay="0" evt="onPrev">
                   <p:tgtEl>
@@ -4459,10 +4458,10 @@
   <p:timing>
     <p:tnLst>
       <p:par>
-        <p:cTn id="53" dur="indefinite" restart="never" nodeType="tmRoot">
+        <p:cTn id="81" dur="indefinite" restart="never" nodeType="tmRoot">
           <p:childTnLst>
             <p:seq>
-              <p:cTn id="54" nodeType="mainSeq"/>
+              <p:cTn id="82" nodeType="mainSeq"/>
               <p:prevCondLst>
                 <p:cond delay="0" evt="onPrev">
                   <p:tgtEl>
@@ -4614,1206 +4613,37 @@
         <p:cTn id="3" dur="indefinite" restart="never" nodeType="tmRoot">
           <p:childTnLst>
             <p:seq>
-              <p:cTn id="4" nodeType="mainSeq"/>
-              <p:prevCondLst>
-                <p:cond delay="0" evt="onPrev">
-                  <p:tgtEl>
-                    <p:sldTgt/>
-                  </p:tgtEl>
-                </p:cond>
-              </p:prevCondLst>
-              <p:nextCondLst>
-                <p:cond delay="0" evt="onNext">
-                  <p:tgtEl>
-                    <p:sldTgt/>
-                  </p:tgtEl>
-                </p:cond>
-              </p:nextCondLst>
-            </p:seq>
-          </p:childTnLst>
-        </p:cTn>
-      </p:par>
-    </p:tnLst>
-  </p:timing>
-</p:sld>
-</file>
-
-<file path=ppt/slides/slide20.xml><?xml version="1.0" encoding="utf-8"?>
-<p:sld xmlns:a="http://schemas.openxmlformats.org/drawingml/2006/main" xmlns:p="http://schemas.openxmlformats.org/presentationml/2006/main" xmlns:r="http://schemas.openxmlformats.org/officeDocument/2006/relationships">
-  <p:cSld>
-    <p:spTree>
-      <p:nvGrpSpPr>
-        <p:cNvPr id="1" name=""/>
-        <p:cNvGrpSpPr/>
-        <p:nvPr/>
-      </p:nvGrpSpPr>
-      <p:grpSpPr>
-        <a:xfrm>
-          <a:off x="0" y="0"/>
-          <a:ext cx="0" cy="0"/>
-          <a:chOff x="0" y="0"/>
-          <a:chExt cx="0" cy="0"/>
-        </a:xfrm>
-      </p:grpSpPr>
-      <p:sp>
-        <p:nvSpPr>
-          <p:cNvPr id="123" name="TextShape 1"/>
-          <p:cNvSpPr txBox="1"/>
-          <p:nvPr/>
-        </p:nvSpPr>
-        <p:spPr>
-          <a:xfrm>
-            <a:off x="432000" y="648000"/>
-            <a:ext cx="7056000" cy="648000"/>
-          </a:xfrm>
-          <a:prstGeom prst="rect">
-            <a:avLst/>
-          </a:prstGeom>
-        </p:spPr>
-        <p:txBody>
-          <a:bodyPr lIns="0" rIns="0" tIns="0" bIns="0" anchor="ctr"/>
-          <a:p>
-            <a:r>
-              <a:rPr lang="en-CA" sz="3390">
-                <a:latin typeface="Arial"/>
-              </a:rPr>
-              <a:t>The model: OAI-PMH</a:t>
-            </a:r>
-            <a:endParaRPr/>
-          </a:p>
-        </p:txBody>
-      </p:sp>
-      <p:sp>
-        <p:nvSpPr>
-          <p:cNvPr id="124" name="TextShape 2"/>
-          <p:cNvSpPr txBox="1"/>
-          <p:nvPr/>
-        </p:nvSpPr>
-        <p:spPr>
-          <a:xfrm>
-            <a:off x="504000" y="2095200"/>
-            <a:ext cx="8870040" cy="4384800"/>
-          </a:xfrm>
-          <a:prstGeom prst="rect">
-            <a:avLst/>
-          </a:prstGeom>
-        </p:spPr>
-        <p:txBody>
-          <a:bodyPr lIns="0" rIns="0" tIns="0" bIns="0"/>
-          <a:p>
-            <a:r>
-              <a:rPr b="1" lang="en-CA" sz="2600">
-                <a:latin typeface="DejaVu Sans Mono"/>
-              </a:rPr>
-              <a:t>?verb=</a:t>
-            </a:r>
-            <a:endParaRPr/>
-          </a:p>
-          <a:p>
-            <a:r>
-              <a:rPr b="1" lang="en-CA" sz="2600">
-                <a:latin typeface="DejaVu Sans Mono"/>
-              </a:rPr>
-              <a:t>Identify</a:t>
-            </a:r>
-            <a:endParaRPr/>
-          </a:p>
-          <a:p>
-            <a:r>
-              <a:rPr b="1" lang="en-CA" sz="2600">
-                <a:latin typeface="DejaVu Sans Mono"/>
-              </a:rPr>
-              <a:t>ListMetadataFormats</a:t>
-            </a:r>
-            <a:endParaRPr/>
-          </a:p>
-          <a:p>
-            <a:r>
-              <a:rPr b="1" lang="en-CA" sz="2600">
-                <a:latin typeface="DejaVu Sans Mono"/>
-              </a:rPr>
-              <a:t>ListIdentifiers</a:t>
-            </a:r>
-            <a:endParaRPr/>
-          </a:p>
-          <a:p>
-            <a:r>
-              <a:rPr b="1" lang="en-CA" sz="2600">
-                <a:latin typeface="DejaVu Sans Mono"/>
-              </a:rPr>
-              <a:t>ListSets</a:t>
-            </a:r>
-            <a:endParaRPr/>
-          </a:p>
-          <a:p>
-            <a:r>
-              <a:rPr b="1" lang="en-CA" sz="2600">
-                <a:latin typeface="DejaVu Sans Mono"/>
-              </a:rPr>
-              <a:t>ListRecords</a:t>
-            </a:r>
-            <a:endParaRPr/>
-          </a:p>
-          <a:p>
-            <a:r>
-              <a:rPr b="1" lang="en-CA" sz="2600">
-                <a:latin typeface="DejaVu Sans Mono"/>
-              </a:rPr>
-              <a:t>GetRecord</a:t>
-            </a:r>
-            <a:endParaRPr/>
-          </a:p>
-          <a:p>
-            <a:pPr>
-              <a:buSzPct val="45000"/>
-              <a:buFont typeface="StarSymbol"/>
-              <a:buChar char=""/>
-            </a:pPr>
-            <a:r>
-              <a:rPr lang="en-CA" sz="2600">
-                <a:solidFill>
-                  <a:srgbClr val="000000"/>
-                </a:solidFill>
-                <a:latin typeface="Arial"/>
-                <a:ea typeface="Droid Sans Fallback"/>
-              </a:rPr>
-              <a:t>http://bcgenesis.uvic.ca/oai.xq?verb=Identify</a:t>
-            </a:r>
-            <a:endParaRPr/>
-          </a:p>
-        </p:txBody>
-      </p:sp>
-    </p:spTree>
-  </p:cSld>
-  <p:timing>
-    <p:tnLst>
-      <p:par>
-        <p:cTn id="55" dur="indefinite" restart="never" nodeType="tmRoot">
-          <p:childTnLst>
-            <p:seq>
-              <p:cTn id="56" nodeType="mainSeq"/>
-              <p:prevCondLst>
-                <p:cond delay="0" evt="onPrev">
-                  <p:tgtEl>
-                    <p:sldTgt/>
-                  </p:tgtEl>
-                </p:cond>
-              </p:prevCondLst>
-              <p:nextCondLst>
-                <p:cond delay="0" evt="onNext">
-                  <p:tgtEl>
-                    <p:sldTgt/>
-                  </p:tgtEl>
-                </p:cond>
-              </p:nextCondLst>
-            </p:seq>
-          </p:childTnLst>
-        </p:cTn>
-      </p:par>
-    </p:tnLst>
-  </p:timing>
-</p:sld>
-</file>
-
-<file path=ppt/slides/slide21.xml><?xml version="1.0" encoding="utf-8"?>
-<p:sld xmlns:a="http://schemas.openxmlformats.org/drawingml/2006/main" xmlns:p="http://schemas.openxmlformats.org/presentationml/2006/main" xmlns:r="http://schemas.openxmlformats.org/officeDocument/2006/relationships">
-  <p:cSld>
-    <p:spTree>
-      <p:nvGrpSpPr>
-        <p:cNvPr id="1" name=""/>
-        <p:cNvGrpSpPr/>
-        <p:nvPr/>
-      </p:nvGrpSpPr>
-      <p:grpSpPr>
-        <a:xfrm>
-          <a:off x="0" y="0"/>
-          <a:ext cx="0" cy="0"/>
-          <a:chOff x="0" y="0"/>
-          <a:chExt cx="0" cy="0"/>
-        </a:xfrm>
-      </p:grpSpPr>
-      <p:sp>
-        <p:nvSpPr>
-          <p:cNvPr id="125" name="TextShape 1"/>
-          <p:cNvSpPr txBox="1"/>
-          <p:nvPr/>
-        </p:nvSpPr>
-        <p:spPr>
-          <a:xfrm>
-            <a:off x="432000" y="648000"/>
-            <a:ext cx="7056000" cy="648000"/>
-          </a:xfrm>
-          <a:prstGeom prst="rect">
-            <a:avLst/>
-          </a:prstGeom>
-        </p:spPr>
-        <p:txBody>
-          <a:bodyPr lIns="0" rIns="0" tIns="0" bIns="0" anchor="ctr"/>
-          <a:p>
-            <a:r>
-              <a:rPr lang="en-CA" sz="3390">
-                <a:latin typeface="Arial"/>
-              </a:rPr>
-              <a:t>The model: OAI-PMH</a:t>
-            </a:r>
-            <a:endParaRPr/>
-          </a:p>
-        </p:txBody>
-      </p:sp>
-      <p:sp>
-        <p:nvSpPr>
-          <p:cNvPr id="126" name="TextShape 2"/>
-          <p:cNvSpPr txBox="1"/>
-          <p:nvPr/>
-        </p:nvSpPr>
-        <p:spPr>
-          <a:xfrm>
-            <a:off x="504000" y="2095200"/>
-            <a:ext cx="8870040" cy="4384800"/>
-          </a:xfrm>
-          <a:prstGeom prst="rect">
-            <a:avLst/>
-          </a:prstGeom>
-        </p:spPr>
-        <p:txBody>
-          <a:bodyPr lIns="0" rIns="0" tIns="0" bIns="0"/>
-          <a:p>
-            <a:pPr>
-              <a:buSzPct val="45000"/>
-              <a:buFont typeface="StarSymbol"/>
-              <a:buChar char=""/>
-            </a:pPr>
-            <a:r>
-              <a:rPr lang="en-CA" sz="1600">
-                <a:solidFill>
-                  <a:srgbClr val="000000"/>
-                </a:solidFill>
-                <a:latin typeface="Arial"/>
-                <a:ea typeface="Droid Sans Fallback"/>
-              </a:rPr>
-              <a:t>http://bcgenesis.uvic.ca/oai.xq?verb=ListRecords&amp;metadataPrefix=oai_dc</a:t>
-            </a:r>
-            <a:endParaRPr/>
-          </a:p>
-          <a:p>
-            <a:pPr>
-              <a:buSzPct val="45000"/>
-              <a:buFont typeface="StarSymbol"/>
-              <a:buChar char=""/>
-            </a:pPr>
-            <a:r>
-              <a:rPr lang="en-CA" sz="2600">
-                <a:solidFill>
-                  <a:srgbClr val="000000"/>
-                </a:solidFill>
-                <a:latin typeface="Arial"/>
-                <a:ea typeface="Droid Sans Fallback"/>
-              </a:rPr>
-              <a:t>Resumption token:</a:t>
-            </a:r>
-            <a:endParaRPr/>
-          </a:p>
-          <a:p>
-            <a:r>
-              <a:rPr lang="en-CA" sz="3000">
-                <a:solidFill>
-                  <a:srgbClr val="000096"/>
-                </a:solidFill>
-                <a:latin typeface="Times New Roman"/>
-                <a:ea typeface="Droid Sans Fallback"/>
-              </a:rPr>
-              <a:t>&lt;resumptionToken</a:t>
-            </a:r>
-            <a:r>
-              <a:rPr lang="en-CA" sz="3000">
-                <a:solidFill>
-                  <a:srgbClr val="f5844c"/>
-                </a:solidFill>
-                <a:latin typeface="Times New Roman"/>
-                <a:ea typeface="Droid Sans Fallback"/>
-              </a:rPr>
-              <a:t> completeListSize</a:t>
-            </a:r>
-            <a:r>
-              <a:rPr lang="en-CA" sz="3000">
-                <a:solidFill>
-                  <a:srgbClr val="ff8040"/>
-                </a:solidFill>
-                <a:latin typeface="Times New Roman"/>
-                <a:ea typeface="Droid Sans Fallback"/>
-              </a:rPr>
-              <a:t>=</a:t>
-            </a:r>
-            <a:r>
-              <a:rPr lang="en-CA" sz="3000">
-                <a:solidFill>
-                  <a:srgbClr val="993300"/>
-                </a:solidFill>
-                <a:latin typeface="Times New Roman"/>
-                <a:ea typeface="Droid Sans Fallback"/>
-              </a:rPr>
-              <a:t>"7154"</a:t>
-            </a:r>
-            <a:r>
-              <a:rPr lang="en-CA" sz="3000">
-                <a:solidFill>
-                  <a:srgbClr val="000096"/>
-                </a:solidFill>
-                <a:latin typeface="Times New Roman"/>
-                <a:ea typeface="Droid Sans Fallback"/>
-              </a:rPr>
-              <a:t>&gt;</a:t>
-            </a:r>
-            <a:endParaRPr/>
-          </a:p>
-          <a:p>
-            <a:r>
-              <a:rPr lang="en-CA" sz="3000">
-                <a:solidFill>
-                  <a:srgbClr val="000096"/>
-                </a:solidFill>
-                <a:latin typeface="Times New Roman"/>
-                <a:ea typeface="Droid Sans Fallback"/>
-              </a:rPr>
-              <a:t>    </a:t>
-            </a:r>
-            <a:r>
-              <a:rPr lang="en-CA" sz="3000">
-                <a:solidFill>
-                  <a:srgbClr val="000000"/>
-                </a:solidFill>
-                <a:latin typeface="Times New Roman"/>
-                <a:ea typeface="Droid Sans Fallback"/>
-              </a:rPr>
-              <a:t>from:2010-01-01;until:2020-01-01;set:;next:21</a:t>
-            </a:r>
-            <a:endParaRPr/>
-          </a:p>
-          <a:p>
-            <a:r>
-              <a:rPr lang="en-CA" sz="3000">
-                <a:solidFill>
-                  <a:srgbClr val="000080"/>
-                </a:solidFill>
-                <a:latin typeface="Arial"/>
-                <a:ea typeface="Droid Sans Fallback"/>
-              </a:rPr>
-              <a:t>&lt;/resumptionToken&gt;</a:t>
-            </a:r>
-            <a:endParaRPr/>
-          </a:p>
-        </p:txBody>
-      </p:sp>
-    </p:spTree>
-  </p:cSld>
-  <p:timing>
-    <p:tnLst>
-      <p:par>
-        <p:cTn id="57" dur="indefinite" restart="never" nodeType="tmRoot">
-          <p:childTnLst>
-            <p:seq>
-              <p:cTn id="58" nodeType="mainSeq"/>
-              <p:prevCondLst>
-                <p:cond delay="0" evt="onPrev">
-                  <p:tgtEl>
-                    <p:sldTgt/>
-                  </p:tgtEl>
-                </p:cond>
-              </p:prevCondLst>
-              <p:nextCondLst>
-                <p:cond delay="0" evt="onNext">
-                  <p:tgtEl>
-                    <p:sldTgt/>
-                  </p:tgtEl>
-                </p:cond>
-              </p:nextCondLst>
-            </p:seq>
-          </p:childTnLst>
-        </p:cTn>
-      </p:par>
-    </p:tnLst>
-  </p:timing>
-</p:sld>
-</file>
-
-<file path=ppt/slides/slide22.xml><?xml version="1.0" encoding="utf-8"?>
-<p:sld xmlns:a="http://schemas.openxmlformats.org/drawingml/2006/main" xmlns:p="http://schemas.openxmlformats.org/presentationml/2006/main" xmlns:r="http://schemas.openxmlformats.org/officeDocument/2006/relationships">
-  <p:cSld>
-    <p:spTree>
-      <p:nvGrpSpPr>
-        <p:cNvPr id="1" name=""/>
-        <p:cNvGrpSpPr/>
-        <p:nvPr/>
-      </p:nvGrpSpPr>
-      <p:grpSpPr>
-        <a:xfrm>
-          <a:off x="0" y="0"/>
-          <a:ext cx="0" cy="0"/>
-          <a:chOff x="0" y="0"/>
-          <a:chExt cx="0" cy="0"/>
-        </a:xfrm>
-      </p:grpSpPr>
-      <p:sp>
-        <p:nvSpPr>
-          <p:cNvPr id="127" name="TextShape 1"/>
-          <p:cNvSpPr txBox="1"/>
-          <p:nvPr/>
-        </p:nvSpPr>
-        <p:spPr>
-          <a:xfrm>
-            <a:off x="432000" y="648000"/>
-            <a:ext cx="7056000" cy="648000"/>
-          </a:xfrm>
-          <a:prstGeom prst="rect">
-            <a:avLst/>
-          </a:prstGeom>
-        </p:spPr>
-        <p:txBody>
-          <a:bodyPr lIns="0" rIns="0" tIns="0" bIns="0" anchor="ctr"/>
-          <a:p>
-            <a:r>
-              <a:rPr lang="en-CA" sz="3390">
-                <a:latin typeface="Arial"/>
-              </a:rPr>
-              <a:t>The nitty-gritty of CodeSharing</a:t>
-            </a:r>
-            <a:endParaRPr/>
-          </a:p>
-        </p:txBody>
-      </p:sp>
-      <p:sp>
-        <p:nvSpPr>
-          <p:cNvPr id="128" name="TextShape 2"/>
-          <p:cNvSpPr txBox="1"/>
-          <p:nvPr/>
-        </p:nvSpPr>
-        <p:spPr>
-          <a:xfrm>
-            <a:off x="504000" y="2095200"/>
-            <a:ext cx="8870040" cy="4384800"/>
-          </a:xfrm>
-          <a:prstGeom prst="rect">
-            <a:avLst/>
-          </a:prstGeom>
-        </p:spPr>
-        <p:txBody>
-          <a:bodyPr lIns="0" rIns="0" tIns="0" bIns="0"/>
-          <a:p>
-            <a:pPr>
-              <a:buSzPct val="45000"/>
-              <a:buFont typeface="StarSymbol"/>
-              <a:buChar char=""/>
-            </a:pPr>
-            <a:r>
-              <a:rPr lang="en-CA" sz="3600">
-                <a:latin typeface="DejaVu Sans Mono"/>
-              </a:rPr>
-              <a:t>codesharing?verb=</a:t>
-            </a:r>
-            <a:endParaRPr/>
-          </a:p>
-          <a:p>
-            <a:r>
-              <a:rPr lang="en-CA" sz="3600">
-                <a:latin typeface="DejaVu Sans Mono"/>
-              </a:rPr>
-              <a:t>identify</a:t>
-            </a:r>
-            <a:endParaRPr/>
-          </a:p>
-          <a:p>
-            <a:r>
-              <a:rPr lang="en-CA" sz="3600">
-                <a:latin typeface="DejaVu Sans Mono"/>
-              </a:rPr>
-              <a:t>listElements</a:t>
-            </a:r>
-            <a:endParaRPr/>
-          </a:p>
-          <a:p>
-            <a:r>
-              <a:rPr lang="en-CA" sz="3600">
-                <a:latin typeface="DejaVu Sans Mono"/>
-              </a:rPr>
-              <a:t>listAttributes</a:t>
-            </a:r>
-            <a:endParaRPr/>
-          </a:p>
-          <a:p>
-            <a:r>
-              <a:rPr lang="en-CA" sz="3600">
-                <a:latin typeface="DejaVu Sans Mono"/>
-              </a:rPr>
-              <a:t>listNamespaces</a:t>
-            </a:r>
-            <a:endParaRPr/>
-          </a:p>
-          <a:p>
-            <a:r>
-              <a:rPr lang="en-CA" sz="3600">
-                <a:latin typeface="DejaVu Sans Mono"/>
-              </a:rPr>
-              <a:t>listDocumentTypes</a:t>
-            </a:r>
-            <a:endParaRPr/>
-          </a:p>
-          <a:p>
-            <a:r>
-              <a:rPr lang="en-CA" sz="3600">
-                <a:latin typeface="DejaVu Sans Mono"/>
-              </a:rPr>
-              <a:t>getExamples</a:t>
-            </a:r>
-            <a:endParaRPr/>
-          </a:p>
-          <a:p>
-            <a:pPr lvl="1">
-              <a:buSzPct val="75000"/>
-              <a:buFont typeface="StarSymbol"/>
-              <a:buChar char=""/>
-            </a:pPr>
-            <a:endParaRPr/>
-          </a:p>
-        </p:txBody>
-      </p:sp>
-    </p:spTree>
-  </p:cSld>
-  <p:timing>
-    <p:tnLst>
-      <p:par>
-        <p:cTn id="59" dur="indefinite" restart="never" nodeType="tmRoot">
-          <p:childTnLst>
-            <p:seq>
-              <p:cTn id="60" nodeType="mainSeq"/>
-              <p:prevCondLst>
-                <p:cond delay="0" evt="onPrev">
-                  <p:tgtEl>
-                    <p:sldTgt/>
-                  </p:tgtEl>
-                </p:cond>
-              </p:prevCondLst>
-              <p:nextCondLst>
-                <p:cond delay="0" evt="onNext">
-                  <p:tgtEl>
-                    <p:sldTgt/>
-                  </p:tgtEl>
-                </p:cond>
-              </p:nextCondLst>
-            </p:seq>
-          </p:childTnLst>
-        </p:cTn>
-      </p:par>
-    </p:tnLst>
-  </p:timing>
-</p:sld>
-</file>
-
-<file path=ppt/slides/slide23.xml><?xml version="1.0" encoding="utf-8"?>
-<p:sld xmlns:a="http://schemas.openxmlformats.org/drawingml/2006/main" xmlns:p="http://schemas.openxmlformats.org/presentationml/2006/main" xmlns:r="http://schemas.openxmlformats.org/officeDocument/2006/relationships">
-  <p:cSld>
-    <p:spTree>
-      <p:nvGrpSpPr>
-        <p:cNvPr id="1" name=""/>
-        <p:cNvGrpSpPr/>
-        <p:nvPr/>
-      </p:nvGrpSpPr>
-      <p:grpSpPr>
-        <a:xfrm>
-          <a:off x="0" y="0"/>
-          <a:ext cx="0" cy="0"/>
-          <a:chOff x="0" y="0"/>
-          <a:chExt cx="0" cy="0"/>
-        </a:xfrm>
-      </p:grpSpPr>
-      <p:sp>
-        <p:nvSpPr>
-          <p:cNvPr id="129" name="TextShape 1"/>
-          <p:cNvSpPr txBox="1"/>
-          <p:nvPr/>
-        </p:nvSpPr>
-        <p:spPr>
-          <a:xfrm>
-            <a:off x="432000" y="648000"/>
-            <a:ext cx="7056000" cy="648000"/>
-          </a:xfrm>
-          <a:prstGeom prst="rect">
-            <a:avLst/>
-          </a:prstGeom>
-        </p:spPr>
-        <p:txBody>
-          <a:bodyPr lIns="0" rIns="0" tIns="0" bIns="0" anchor="ctr"/>
-          <a:p>
-            <a:r>
-              <a:rPr lang="en-CA" sz="3390">
-                <a:latin typeface="Arial"/>
-              </a:rPr>
-              <a:t>The nitty-gritty of CodeSharing</a:t>
-            </a:r>
-            <a:endParaRPr/>
-          </a:p>
-        </p:txBody>
-      </p:sp>
-      <p:sp>
-        <p:nvSpPr>
-          <p:cNvPr id="130" name="TextShape 2"/>
-          <p:cNvSpPr txBox="1"/>
-          <p:nvPr/>
-        </p:nvSpPr>
-        <p:spPr>
-          <a:xfrm>
-            <a:off x="504000" y="1872000"/>
-            <a:ext cx="8870040" cy="4896000"/>
-          </a:xfrm>
-          <a:prstGeom prst="rect">
-            <a:avLst/>
-          </a:prstGeom>
-        </p:spPr>
-        <p:txBody>
-          <a:bodyPr lIns="0" rIns="0" tIns="0" bIns="0"/>
-          <a:p>
-            <a:pPr>
-              <a:buSzPct val="45000"/>
-              <a:buFont typeface="StarSymbol"/>
-              <a:buChar char=""/>
-            </a:pPr>
-            <a:r>
-              <a:rPr lang="en-CA" sz="3600">
-                <a:latin typeface="DejaVu Sans Mono"/>
-              </a:rPr>
-              <a:t>codesharing?</a:t>
-            </a:r>
-            <a:r>
-              <a:rPr lang="en-CA" sz="3600">
-                <a:solidFill>
-                  <a:srgbClr val="ff0000"/>
-                </a:solidFill>
-                <a:latin typeface="DejaVu Sans Mono"/>
-              </a:rPr>
-              <a:t>verb</a:t>
-            </a:r>
-            <a:r>
-              <a:rPr lang="en-CA" sz="3600">
-                <a:latin typeface="DejaVu Sans Mono"/>
-              </a:rPr>
-              <a:t>=</a:t>
-            </a:r>
-            <a:r>
-              <a:rPr lang="en-CA" sz="3600">
-                <a:solidFill>
-                  <a:srgbClr val="0000ff"/>
-                </a:solidFill>
-                <a:latin typeface="DejaVu Sans Mono"/>
-              </a:rPr>
-              <a:t>getExamples</a:t>
-            </a:r>
-            <a:endParaRPr/>
-          </a:p>
-          <a:p>
-            <a:r>
-              <a:rPr lang="en-CA" sz="3600">
-                <a:latin typeface="DejaVu Sans Mono"/>
-              </a:rPr>
-              <a:t>&amp;</a:t>
-            </a:r>
-            <a:r>
-              <a:rPr lang="en-CA" sz="3600">
-                <a:solidFill>
-                  <a:srgbClr val="ff0000"/>
-                </a:solidFill>
-                <a:latin typeface="DejaVu Sans Mono"/>
-              </a:rPr>
-              <a:t>elementName</a:t>
-            </a:r>
-            <a:r>
-              <a:rPr lang="en-CA" sz="3600">
-                <a:latin typeface="DejaVu Sans Mono"/>
-              </a:rPr>
-              <a:t>=</a:t>
-            </a:r>
-            <a:endParaRPr/>
-          </a:p>
-          <a:p>
-            <a:r>
-              <a:rPr lang="en-CA" sz="3600">
-                <a:latin typeface="DejaVu Sans Mono"/>
-              </a:rPr>
-              <a:t>&amp;</a:t>
-            </a:r>
-            <a:r>
-              <a:rPr lang="en-CA" sz="3600">
-                <a:solidFill>
-                  <a:srgbClr val="ff0000"/>
-                </a:solidFill>
-                <a:latin typeface="DejaVu Sans Mono"/>
-              </a:rPr>
-              <a:t>attributeName</a:t>
-            </a:r>
-            <a:r>
-              <a:rPr lang="en-CA" sz="3600">
-                <a:latin typeface="DejaVu Sans Mono"/>
-              </a:rPr>
-              <a:t>=</a:t>
-            </a:r>
-            <a:endParaRPr/>
-          </a:p>
-          <a:p>
-            <a:r>
-              <a:rPr lang="en-CA" sz="3600">
-                <a:latin typeface="DejaVu Sans Mono"/>
-              </a:rPr>
-              <a:t>&amp;</a:t>
-            </a:r>
-            <a:r>
-              <a:rPr lang="en-CA" sz="3600">
-                <a:solidFill>
-                  <a:srgbClr val="ff0000"/>
-                </a:solidFill>
-                <a:latin typeface="DejaVu Sans Mono"/>
-              </a:rPr>
-              <a:t>attributeValue</a:t>
-            </a:r>
-            <a:r>
-              <a:rPr lang="en-CA" sz="3600">
-                <a:latin typeface="DejaVu Sans Mono"/>
-              </a:rPr>
-              <a:t>=</a:t>
-            </a:r>
-            <a:endParaRPr/>
-          </a:p>
-          <a:p>
-            <a:r>
-              <a:rPr lang="en-CA" sz="3600">
-                <a:latin typeface="DejaVu Sans Mono"/>
-              </a:rPr>
-              <a:t>&amp;</a:t>
-            </a:r>
-            <a:r>
-              <a:rPr lang="en-CA" sz="3600">
-                <a:solidFill>
-                  <a:srgbClr val="ff0000"/>
-                </a:solidFill>
-                <a:latin typeface="DejaVu Sans Mono"/>
-              </a:rPr>
-              <a:t>namespace</a:t>
-            </a:r>
-            <a:r>
-              <a:rPr lang="en-CA" sz="3600">
-                <a:latin typeface="DejaVu Sans Mono"/>
-              </a:rPr>
-              <a:t>=</a:t>
-            </a:r>
-            <a:endParaRPr/>
-          </a:p>
-          <a:p>
-            <a:r>
-              <a:rPr lang="en-CA" sz="3600">
-                <a:latin typeface="DejaVu Sans Mono"/>
-              </a:rPr>
-              <a:t>&amp;</a:t>
-            </a:r>
-            <a:r>
-              <a:rPr lang="en-CA" sz="3600">
-                <a:solidFill>
-                  <a:srgbClr val="ff0000"/>
-                </a:solidFill>
-                <a:latin typeface="DejaVu Sans Mono"/>
-              </a:rPr>
-              <a:t>wrapped</a:t>
-            </a:r>
-            <a:r>
-              <a:rPr lang="en-CA" sz="3600">
-                <a:latin typeface="DejaVu Sans Mono"/>
-              </a:rPr>
-              <a:t>=</a:t>
-            </a:r>
-            <a:endParaRPr/>
-          </a:p>
-          <a:p>
-            <a:r>
-              <a:rPr lang="en-CA" sz="3600">
-                <a:latin typeface="DejaVu Sans Mono"/>
-              </a:rPr>
-              <a:t>&amp;</a:t>
-            </a:r>
-            <a:r>
-              <a:rPr lang="en-CA" sz="3600">
-                <a:solidFill>
-                  <a:srgbClr val="ff0000"/>
-                </a:solidFill>
-                <a:latin typeface="DejaVu Sans Mono"/>
-              </a:rPr>
-              <a:t>maxItemsPerPage</a:t>
-            </a:r>
-            <a:r>
-              <a:rPr lang="en-CA" sz="3600">
-                <a:latin typeface="DejaVu Sans Mono"/>
-              </a:rPr>
-              <a:t>=</a:t>
-            </a:r>
-            <a:endParaRPr/>
-          </a:p>
-          <a:p>
-            <a:endParaRPr/>
-          </a:p>
-          <a:p>
-            <a:pPr lvl="1">
-              <a:buSzPct val="75000"/>
-              <a:buFont typeface="StarSymbol"/>
-              <a:buChar char=""/>
-            </a:pPr>
-            <a:endParaRPr/>
-          </a:p>
-        </p:txBody>
-      </p:sp>
-    </p:spTree>
-  </p:cSld>
-  <p:timing>
-    <p:tnLst>
-      <p:par>
-        <p:cTn id="61" dur="indefinite" restart="never" nodeType="tmRoot">
-          <p:childTnLst>
-            <p:seq>
-              <p:cTn id="62" nodeType="mainSeq"/>
-              <p:prevCondLst>
-                <p:cond delay="0" evt="onPrev">
-                  <p:tgtEl>
-                    <p:sldTgt/>
-                  </p:tgtEl>
-                </p:cond>
-              </p:prevCondLst>
-              <p:nextCondLst>
-                <p:cond delay="0" evt="onNext">
-                  <p:tgtEl>
-                    <p:sldTgt/>
-                  </p:tgtEl>
-                </p:cond>
-              </p:nextCondLst>
-            </p:seq>
-          </p:childTnLst>
-        </p:cTn>
-      </p:par>
-    </p:tnLst>
-  </p:timing>
-</p:sld>
-</file>
-
-<file path=ppt/slides/slide24.xml><?xml version="1.0" encoding="utf-8"?>
-<p:sld xmlns:a="http://schemas.openxmlformats.org/drawingml/2006/main" xmlns:p="http://schemas.openxmlformats.org/presentationml/2006/main" xmlns:r="http://schemas.openxmlformats.org/officeDocument/2006/relationships">
-  <p:cSld>
-    <p:spTree>
-      <p:nvGrpSpPr>
-        <p:cNvPr id="1" name=""/>
-        <p:cNvGrpSpPr/>
-        <p:nvPr/>
-      </p:nvGrpSpPr>
-      <p:grpSpPr>
-        <a:xfrm>
-          <a:off x="0" y="0"/>
-          <a:ext cx="0" cy="0"/>
-          <a:chOff x="0" y="0"/>
-          <a:chExt cx="0" cy="0"/>
-        </a:xfrm>
-      </p:grpSpPr>
-      <p:sp>
-        <p:nvSpPr>
-          <p:cNvPr id="131" name="TextShape 1"/>
-          <p:cNvSpPr txBox="1"/>
-          <p:nvPr/>
-        </p:nvSpPr>
-        <p:spPr>
-          <a:xfrm>
-            <a:off x="432000" y="648000"/>
-            <a:ext cx="7056000" cy="648000"/>
-          </a:xfrm>
-          <a:prstGeom prst="rect">
-            <a:avLst/>
-          </a:prstGeom>
-        </p:spPr>
-        <p:txBody>
-          <a:bodyPr lIns="0" rIns="0" tIns="0" bIns="0" anchor="ctr"/>
-          <a:p>
-            <a:r>
-              <a:rPr lang="en-CA" sz="3390">
-                <a:latin typeface="Arial"/>
-              </a:rPr>
-              <a:t>The nitty-gritty of CodeSharing</a:t>
-            </a:r>
-            <a:endParaRPr/>
-          </a:p>
-        </p:txBody>
-      </p:sp>
-      <p:sp>
-        <p:nvSpPr>
-          <p:cNvPr id="132" name="TextShape 2"/>
-          <p:cNvSpPr txBox="1"/>
-          <p:nvPr/>
-        </p:nvSpPr>
-        <p:spPr>
-          <a:xfrm>
-            <a:off x="504000" y="1872000"/>
-            <a:ext cx="8870040" cy="4896000"/>
-          </a:xfrm>
-          <a:prstGeom prst="rect">
-            <a:avLst/>
-          </a:prstGeom>
-        </p:spPr>
-        <p:txBody>
-          <a:bodyPr lIns="0" rIns="0" tIns="0" bIns="0"/>
-          <a:p>
-            <a:pPr>
-              <a:buSzPct val="45000"/>
-              <a:buFont typeface="StarSymbol"/>
-              <a:buChar char=""/>
-            </a:pPr>
-            <a:r>
-              <a:rPr lang="en-CA" sz="3600">
-                <a:latin typeface="DejaVu Sans Mono"/>
-              </a:rPr>
-              <a:t>codesharing?</a:t>
-            </a:r>
-            <a:r>
-              <a:rPr lang="en-CA" sz="3600">
-                <a:solidFill>
-                  <a:srgbClr val="ff0000"/>
-                </a:solidFill>
-                <a:latin typeface="DejaVu Sans Mono"/>
-              </a:rPr>
-              <a:t>verb</a:t>
-            </a:r>
-            <a:r>
-              <a:rPr lang="en-CA" sz="3600">
-                <a:latin typeface="DejaVu Sans Mono"/>
-              </a:rPr>
-              <a:t>=</a:t>
-            </a:r>
-            <a:r>
-              <a:rPr lang="en-CA" sz="3600">
-                <a:solidFill>
-                  <a:srgbClr val="0000ff"/>
-                </a:solidFill>
-                <a:latin typeface="DejaVu Sans Mono"/>
-              </a:rPr>
-              <a:t>getExamples</a:t>
-            </a:r>
-            <a:endParaRPr/>
-          </a:p>
-          <a:p>
-            <a:r>
-              <a:rPr lang="en-CA" sz="3600">
-                <a:latin typeface="DejaVu Sans Mono"/>
-              </a:rPr>
-              <a:t>&amp;</a:t>
-            </a:r>
-            <a:r>
-              <a:rPr lang="en-CA" sz="3600">
-                <a:solidFill>
-                  <a:srgbClr val="ff0000"/>
-                </a:solidFill>
-                <a:latin typeface="DejaVu Sans Mono"/>
-              </a:rPr>
-              <a:t>elementName</a:t>
-            </a:r>
-            <a:r>
-              <a:rPr lang="en-CA" sz="3600">
-                <a:latin typeface="DejaVu Sans Mono"/>
-              </a:rPr>
-              <a:t>=</a:t>
-            </a:r>
-            <a:r>
-              <a:rPr lang="en-CA" sz="3600">
-                <a:solidFill>
-                  <a:srgbClr val="0000ff"/>
-                </a:solidFill>
-                <a:latin typeface="DejaVu Sans Mono"/>
-              </a:rPr>
-              <a:t>title</a:t>
-            </a:r>
-            <a:endParaRPr/>
-          </a:p>
-          <a:p>
-            <a:r>
-              <a:rPr lang="en-CA" sz="3600">
-                <a:latin typeface="DejaVu Sans Mono"/>
-              </a:rPr>
-              <a:t>&amp;</a:t>
-            </a:r>
-            <a:r>
-              <a:rPr lang="en-CA" sz="3600">
-                <a:solidFill>
-                  <a:srgbClr val="ff0000"/>
-                </a:solidFill>
-                <a:latin typeface="DejaVu Sans Mono"/>
-              </a:rPr>
-              <a:t>attributeName</a:t>
-            </a:r>
-            <a:r>
-              <a:rPr lang="en-CA" sz="3600">
-                <a:latin typeface="DejaVu Sans Mono"/>
-              </a:rPr>
-              <a:t>=</a:t>
-            </a:r>
-            <a:r>
-              <a:rPr lang="en-CA" sz="3600">
-                <a:solidFill>
-                  <a:srgbClr val="0000ff"/>
-                </a:solidFill>
-                <a:latin typeface="DejaVu Sans Mono"/>
-              </a:rPr>
-              <a:t>level</a:t>
-            </a:r>
-            <a:endParaRPr/>
-          </a:p>
-          <a:p>
-            <a:r>
-              <a:rPr lang="en-CA" sz="3600">
-                <a:latin typeface="DejaVu Sans Mono"/>
-              </a:rPr>
-              <a:t>&amp;</a:t>
-            </a:r>
-            <a:r>
-              <a:rPr lang="en-CA" sz="3600">
-                <a:solidFill>
-                  <a:srgbClr val="ff0000"/>
-                </a:solidFill>
-                <a:latin typeface="DejaVu Sans Mono"/>
-              </a:rPr>
-              <a:t>attributeValue</a:t>
-            </a:r>
-            <a:r>
-              <a:rPr lang="en-CA" sz="3600">
-                <a:latin typeface="DejaVu Sans Mono"/>
-              </a:rPr>
-              <a:t>=</a:t>
-            </a:r>
-            <a:r>
-              <a:rPr lang="en-CA" sz="3600">
-                <a:solidFill>
-                  <a:srgbClr val="0000ff"/>
-                </a:solidFill>
-                <a:latin typeface="DejaVu Sans Mono"/>
-              </a:rPr>
-              <a:t>m</a:t>
-            </a:r>
-            <a:endParaRPr/>
-          </a:p>
-          <a:p>
-            <a:r>
-              <a:rPr lang="en-CA" sz="3600">
-                <a:latin typeface="DejaVu Sans Mono"/>
-              </a:rPr>
-              <a:t>&amp;</a:t>
-            </a:r>
-            <a:r>
-              <a:rPr lang="en-CA" sz="3600">
-                <a:solidFill>
-                  <a:srgbClr val="ff0000"/>
-                </a:solidFill>
-                <a:latin typeface="DejaVu Sans Mono"/>
-              </a:rPr>
-              <a:t>wrapped</a:t>
-            </a:r>
-            <a:r>
-              <a:rPr lang="en-CA" sz="3600">
-                <a:latin typeface="DejaVu Sans Mono"/>
-              </a:rPr>
-              <a:t>=</a:t>
-            </a:r>
-            <a:r>
-              <a:rPr lang="en-CA" sz="3600">
-                <a:solidFill>
-                  <a:srgbClr val="0000ff"/>
-                </a:solidFill>
-                <a:latin typeface="DejaVu Sans Mono"/>
-              </a:rPr>
-              <a:t>true</a:t>
-            </a:r>
-            <a:endParaRPr/>
-          </a:p>
-          <a:p>
-            <a:r>
-              <a:rPr lang="en-CA" sz="3600">
-                <a:latin typeface="DejaVu Sans Mono"/>
-              </a:rPr>
-              <a:t>&amp;</a:t>
-            </a:r>
-            <a:r>
-              <a:rPr lang="en-CA" sz="3600">
-                <a:solidFill>
-                  <a:srgbClr val="ff0000"/>
-                </a:solidFill>
-                <a:latin typeface="DejaVu Sans Mono"/>
-              </a:rPr>
-              <a:t>maxItemsPerPage</a:t>
-            </a:r>
-            <a:r>
-              <a:rPr lang="en-CA" sz="3600">
-                <a:latin typeface="DejaVu Sans Mono"/>
-              </a:rPr>
-              <a:t>=</a:t>
-            </a:r>
-            <a:r>
-              <a:rPr lang="en-CA" sz="3600">
-                <a:solidFill>
-                  <a:srgbClr val="0000ff"/>
-                </a:solidFill>
-                <a:latin typeface="DejaVu Sans Mono"/>
-              </a:rPr>
-              <a:t>100</a:t>
-            </a:r>
-            <a:endParaRPr/>
-          </a:p>
-          <a:p>
-            <a:endParaRPr/>
-          </a:p>
-          <a:p>
-            <a:pPr lvl="1">
-              <a:buSzPct val="75000"/>
-              <a:buFont typeface="StarSymbol"/>
-              <a:buChar char=""/>
-            </a:pPr>
-            <a:endParaRPr/>
-          </a:p>
-        </p:txBody>
-      </p:sp>
-    </p:spTree>
-  </p:cSld>
-  <p:timing>
-    <p:tnLst>
-      <p:par>
-        <p:cTn id="63" dur="indefinite" restart="never" nodeType="tmRoot">
-          <p:childTnLst>
-            <p:seq>
-              <p:cTn id="64" nodeType="mainSeq">
+              <p:cTn id="4" nodeType="mainSeq">
                 <p:childTnLst>
                   <p:par>
-                    <p:cTn id="65" fill="freeze">
+                    <p:cTn id="5" fill="freeze">
                       <p:stCondLst>
                         <p:cond delay="indefinite"/>
                       </p:stCondLst>
                       <p:childTnLst>
                         <p:par>
-                          <p:cTn id="66" fill="freeze">
+                          <p:cTn id="6" fill="freeze">
                             <p:stCondLst>
                               <p:cond delay="0"/>
                             </p:stCondLst>
                             <p:childTnLst>
                               <p:par>
-                                <p:cTn id="67" nodeType="clickEffect" fill="hold" presetClass="entr" presetID="1">
+                                <p:cTn id="7" nodeType="clickEffect" fill="hold" presetClass="entr" presetID="1">
                                   <p:stCondLst>
                                     <p:cond delay="0"/>
                                   </p:stCondLst>
                                   <p:childTnLst>
                                     <p:set>
                                       <p:cBhvr>
-                                        <p:cTn id="68" dur="1" fill="hold">
+                                        <p:cTn id="8" dur="1" fill="hold">
                                           <p:stCondLst>
                                             <p:cond delay="0"/>
                                           </p:stCondLst>
                                         </p:cTn>
                                         <p:tgtEl>
-                                          <p:spTgt spid="132">
+                                          <p:spTgt spid="87">
                                             <p:txEl>
-                                              <p:pRg st="48" end="69"/>
+                                              <p:pRg st="0" end="95"/>
                                             </p:txEl>
                                           </p:spTgt>
                                         </p:tgtEl>
@@ -5835,34 +4665,34 @@
                     </p:cTn>
                   </p:par>
                   <p:par>
-                    <p:cTn id="69" fill="freeze">
+                    <p:cTn id="9" fill="freeze">
                       <p:stCondLst>
                         <p:cond delay="indefinite"/>
                       </p:stCondLst>
                       <p:childTnLst>
                         <p:par>
-                          <p:cTn id="70" fill="freeze">
+                          <p:cTn id="10" fill="freeze">
                             <p:stCondLst>
                               <p:cond delay="0"/>
                             </p:stCondLst>
                             <p:childTnLst>
                               <p:par>
-                                <p:cTn id="71" nodeType="clickEffect" fill="hold" presetClass="entr" presetID="1">
+                                <p:cTn id="11" nodeType="clickEffect" fill="hold" presetClass="entr" presetID="1">
                                   <p:stCondLst>
                                     <p:cond delay="0"/>
                                   </p:stCondLst>
                                   <p:childTnLst>
                                     <p:set>
                                       <p:cBhvr>
-                                        <p:cTn id="72" dur="1" fill="hold">
+                                        <p:cTn id="12" dur="1" fill="hold">
                                           <p:stCondLst>
                                             <p:cond delay="0"/>
                                           </p:stCondLst>
                                         </p:cTn>
                                         <p:tgtEl>
-                                          <p:spTgt spid="132">
+                                          <p:spTgt spid="87">
                                             <p:txEl>
-                                              <p:pRg st="69" end="87"/>
+                                              <p:pRg st="95" end="205"/>
                                             </p:txEl>
                                           </p:spTgt>
                                         </p:tgtEl>
@@ -5884,34 +4714,34 @@
                     </p:cTn>
                   </p:par>
                   <p:par>
-                    <p:cTn id="73" fill="freeze">
+                    <p:cTn id="13" fill="freeze">
                       <p:stCondLst>
                         <p:cond delay="indefinite"/>
                       </p:stCondLst>
                       <p:childTnLst>
                         <p:par>
-                          <p:cTn id="74" fill="freeze">
+                          <p:cTn id="14" fill="freeze">
                             <p:stCondLst>
                               <p:cond delay="0"/>
                             </p:stCondLst>
                             <p:childTnLst>
                               <p:par>
-                                <p:cTn id="75" nodeType="clickEffect" fill="hold" presetClass="entr" presetID="1">
+                                <p:cTn id="15" nodeType="clickEffect" fill="hold" presetClass="entr" presetID="1">
                                   <p:stCondLst>
                                     <p:cond delay="0"/>
                                   </p:stCondLst>
                                   <p:childTnLst>
                                     <p:set>
                                       <p:cBhvr>
-                                        <p:cTn id="76" dur="1" fill="hold">
+                                        <p:cTn id="16" dur="1" fill="hold">
                                           <p:stCondLst>
                                             <p:cond delay="0"/>
                                           </p:stCondLst>
                                         </p:cTn>
                                         <p:tgtEl>
-                                          <p:spTgt spid="132">
+                                          <p:spTgt spid="87">
                                             <p:txEl>
-                                              <p:pRg st="87" end="101"/>
+                                              <p:pRg st="205" end="312"/>
                                             </p:txEl>
                                           </p:spTgt>
                                         </p:tgtEl>
@@ -5933,34 +4763,34 @@
                     </p:cTn>
                   </p:par>
                   <p:par>
-                    <p:cTn id="77" fill="freeze">
+                    <p:cTn id="17" fill="freeze">
                       <p:stCondLst>
                         <p:cond delay="indefinite"/>
                       </p:stCondLst>
                       <p:childTnLst>
                         <p:par>
-                          <p:cTn id="78" fill="freeze">
+                          <p:cTn id="18" fill="freeze">
                             <p:stCondLst>
                               <p:cond delay="0"/>
                             </p:stCondLst>
                             <p:childTnLst>
                               <p:par>
-                                <p:cTn id="79" nodeType="clickEffect" fill="hold" presetClass="entr" presetID="1">
+                                <p:cTn id="19" nodeType="clickEffect" fill="hold" presetClass="entr" presetID="1">
                                   <p:stCondLst>
                                     <p:cond delay="0"/>
                                   </p:stCondLst>
                                   <p:childTnLst>
                                     <p:set>
                                       <p:cBhvr>
-                                        <p:cTn id="80" dur="1" fill="hold">
+                                        <p:cTn id="20" dur="1" fill="hold">
                                           <p:stCondLst>
                                             <p:cond delay="0"/>
                                           </p:stCondLst>
                                         </p:cTn>
                                         <p:tgtEl>
-                                          <p:spTgt spid="132">
+                                          <p:spTgt spid="87">
                                             <p:txEl>
-                                              <p:pRg st="101" end="122"/>
+                                              <p:pRg st="312" end="412"/>
                                             </p:txEl>
                                           </p:spTgt>
                                         </p:tgtEl>
@@ -6006,6 +4836,1067 @@
 </p:sld>
 </file>
 
+<file path=ppt/slides/slide20.xml><?xml version="1.0" encoding="utf-8"?>
+<p:sld xmlns:a="http://schemas.openxmlformats.org/drawingml/2006/main" xmlns:p="http://schemas.openxmlformats.org/presentationml/2006/main" xmlns:r="http://schemas.openxmlformats.org/officeDocument/2006/relationships">
+  <p:cSld>
+    <p:spTree>
+      <p:nvGrpSpPr>
+        <p:cNvPr id="1" name=""/>
+        <p:cNvGrpSpPr/>
+        <p:nvPr/>
+      </p:nvGrpSpPr>
+      <p:grpSpPr>
+        <a:xfrm>
+          <a:off x="0" y="0"/>
+          <a:ext cx="0" cy="0"/>
+          <a:chOff x="0" y="0"/>
+          <a:chExt cx="0" cy="0"/>
+        </a:xfrm>
+      </p:grpSpPr>
+      <p:sp>
+        <p:nvSpPr>
+          <p:cNvPr id="123" name="TextShape 1"/>
+          <p:cNvSpPr txBox="1"/>
+          <p:nvPr/>
+        </p:nvSpPr>
+        <p:spPr>
+          <a:xfrm>
+            <a:off x="432000" y="648000"/>
+            <a:ext cx="7056000" cy="648000"/>
+          </a:xfrm>
+          <a:prstGeom prst="rect">
+            <a:avLst/>
+          </a:prstGeom>
+        </p:spPr>
+        <p:txBody>
+          <a:bodyPr lIns="0" rIns="0" tIns="0" bIns="0" anchor="ctr"/>
+          <a:p>
+            <a:r>
+              <a:rPr lang="en-CA" sz="3390">
+                <a:latin typeface="Arial"/>
+              </a:rPr>
+              <a:t>The model: OAI-PMH</a:t>
+            </a:r>
+            <a:endParaRPr/>
+          </a:p>
+        </p:txBody>
+      </p:sp>
+      <p:sp>
+        <p:nvSpPr>
+          <p:cNvPr id="124" name="TextShape 2"/>
+          <p:cNvSpPr txBox="1"/>
+          <p:nvPr/>
+        </p:nvSpPr>
+        <p:spPr>
+          <a:xfrm>
+            <a:off x="504000" y="2095200"/>
+            <a:ext cx="8870040" cy="4384800"/>
+          </a:xfrm>
+          <a:prstGeom prst="rect">
+            <a:avLst/>
+          </a:prstGeom>
+        </p:spPr>
+        <p:txBody>
+          <a:bodyPr lIns="0" rIns="0" tIns="0" bIns="0"/>
+          <a:p>
+            <a:r>
+              <a:rPr b="1" lang="en-CA" sz="2600">
+                <a:latin typeface="DejaVu Sans Mono"/>
+              </a:rPr>
+              <a:t>?verb=</a:t>
+            </a:r>
+            <a:endParaRPr/>
+          </a:p>
+          <a:p>
+            <a:r>
+              <a:rPr b="1" lang="en-CA" sz="2600">
+                <a:latin typeface="DejaVu Sans Mono"/>
+              </a:rPr>
+              <a:t>Identify</a:t>
+            </a:r>
+            <a:endParaRPr/>
+          </a:p>
+          <a:p>
+            <a:r>
+              <a:rPr b="1" lang="en-CA" sz="2600">
+                <a:latin typeface="DejaVu Sans Mono"/>
+              </a:rPr>
+              <a:t>ListMetadataFormats</a:t>
+            </a:r>
+            <a:endParaRPr/>
+          </a:p>
+          <a:p>
+            <a:r>
+              <a:rPr b="1" lang="en-CA" sz="2600">
+                <a:latin typeface="DejaVu Sans Mono"/>
+              </a:rPr>
+              <a:t>ListIdentifiers</a:t>
+            </a:r>
+            <a:endParaRPr/>
+          </a:p>
+          <a:p>
+            <a:r>
+              <a:rPr b="1" lang="en-CA" sz="2600">
+                <a:latin typeface="DejaVu Sans Mono"/>
+              </a:rPr>
+              <a:t>ListSets</a:t>
+            </a:r>
+            <a:endParaRPr/>
+          </a:p>
+          <a:p>
+            <a:r>
+              <a:rPr b="1" lang="en-CA" sz="2600">
+                <a:latin typeface="DejaVu Sans Mono"/>
+              </a:rPr>
+              <a:t>ListRecords</a:t>
+            </a:r>
+            <a:endParaRPr/>
+          </a:p>
+          <a:p>
+            <a:r>
+              <a:rPr b="1" lang="en-CA" sz="2600">
+                <a:latin typeface="DejaVu Sans Mono"/>
+              </a:rPr>
+              <a:t>GetRecord</a:t>
+            </a:r>
+            <a:endParaRPr/>
+          </a:p>
+          <a:p>
+            <a:pPr>
+              <a:buSzPct val="45000"/>
+              <a:buFont typeface="StarSymbol"/>
+              <a:buChar char=""/>
+            </a:pPr>
+            <a:r>
+              <a:rPr lang="en-CA" sz="2600">
+                <a:solidFill>
+                  <a:srgbClr val="000000"/>
+                </a:solidFill>
+                <a:latin typeface="Arial"/>
+                <a:ea typeface="Droid Sans Fallback"/>
+              </a:rPr>
+              <a:t>http://bcgenesis.uvic.ca/oai.xq?verb=Identify</a:t>
+            </a:r>
+            <a:endParaRPr/>
+          </a:p>
+        </p:txBody>
+      </p:sp>
+    </p:spTree>
+  </p:cSld>
+  <p:timing>
+    <p:tnLst>
+      <p:par>
+        <p:cTn id="83" dur="indefinite" restart="never" nodeType="tmRoot">
+          <p:childTnLst>
+            <p:seq>
+              <p:cTn id="84" nodeType="mainSeq"/>
+              <p:prevCondLst>
+                <p:cond delay="0" evt="onPrev">
+                  <p:tgtEl>
+                    <p:sldTgt/>
+                  </p:tgtEl>
+                </p:cond>
+              </p:prevCondLst>
+              <p:nextCondLst>
+                <p:cond delay="0" evt="onNext">
+                  <p:tgtEl>
+                    <p:sldTgt/>
+                  </p:tgtEl>
+                </p:cond>
+              </p:nextCondLst>
+            </p:seq>
+          </p:childTnLst>
+        </p:cTn>
+      </p:par>
+    </p:tnLst>
+  </p:timing>
+</p:sld>
+</file>
+
+<file path=ppt/slides/slide21.xml><?xml version="1.0" encoding="utf-8"?>
+<p:sld xmlns:a="http://schemas.openxmlformats.org/drawingml/2006/main" xmlns:p="http://schemas.openxmlformats.org/presentationml/2006/main" xmlns:r="http://schemas.openxmlformats.org/officeDocument/2006/relationships">
+  <p:cSld>
+    <p:spTree>
+      <p:nvGrpSpPr>
+        <p:cNvPr id="1" name=""/>
+        <p:cNvGrpSpPr/>
+        <p:nvPr/>
+      </p:nvGrpSpPr>
+      <p:grpSpPr>
+        <a:xfrm>
+          <a:off x="0" y="0"/>
+          <a:ext cx="0" cy="0"/>
+          <a:chOff x="0" y="0"/>
+          <a:chExt cx="0" cy="0"/>
+        </a:xfrm>
+      </p:grpSpPr>
+      <p:sp>
+        <p:nvSpPr>
+          <p:cNvPr id="125" name="TextShape 1"/>
+          <p:cNvSpPr txBox="1"/>
+          <p:nvPr/>
+        </p:nvSpPr>
+        <p:spPr>
+          <a:xfrm>
+            <a:off x="432000" y="648000"/>
+            <a:ext cx="7056000" cy="648000"/>
+          </a:xfrm>
+          <a:prstGeom prst="rect">
+            <a:avLst/>
+          </a:prstGeom>
+        </p:spPr>
+        <p:txBody>
+          <a:bodyPr lIns="0" rIns="0" tIns="0" bIns="0" anchor="ctr"/>
+          <a:p>
+            <a:r>
+              <a:rPr lang="en-CA" sz="3390">
+                <a:latin typeface="Arial"/>
+              </a:rPr>
+              <a:t>The model: OAI-PMH</a:t>
+            </a:r>
+            <a:endParaRPr/>
+          </a:p>
+        </p:txBody>
+      </p:sp>
+      <p:sp>
+        <p:nvSpPr>
+          <p:cNvPr id="126" name="TextShape 2"/>
+          <p:cNvSpPr txBox="1"/>
+          <p:nvPr/>
+        </p:nvSpPr>
+        <p:spPr>
+          <a:xfrm>
+            <a:off x="504000" y="2095200"/>
+            <a:ext cx="8870040" cy="4384800"/>
+          </a:xfrm>
+          <a:prstGeom prst="rect">
+            <a:avLst/>
+          </a:prstGeom>
+        </p:spPr>
+        <p:txBody>
+          <a:bodyPr lIns="0" rIns="0" tIns="0" bIns="0"/>
+          <a:p>
+            <a:pPr>
+              <a:buSzPct val="45000"/>
+              <a:buFont typeface="StarSymbol"/>
+              <a:buChar char=""/>
+            </a:pPr>
+            <a:r>
+              <a:rPr lang="en-CA" sz="1600">
+                <a:solidFill>
+                  <a:srgbClr val="000000"/>
+                </a:solidFill>
+                <a:latin typeface="Arial"/>
+                <a:ea typeface="Droid Sans Fallback"/>
+              </a:rPr>
+              <a:t>http://bcgenesis.uvic.ca/oai.xq?verb=ListRecords&amp;metadataPrefix=oai_dc</a:t>
+            </a:r>
+            <a:endParaRPr/>
+          </a:p>
+          <a:p>
+            <a:pPr>
+              <a:buSzPct val="45000"/>
+              <a:buFont typeface="StarSymbol"/>
+              <a:buChar char=""/>
+            </a:pPr>
+            <a:r>
+              <a:rPr lang="en-CA" sz="2600">
+                <a:solidFill>
+                  <a:srgbClr val="000000"/>
+                </a:solidFill>
+                <a:latin typeface="Arial"/>
+                <a:ea typeface="Droid Sans Fallback"/>
+              </a:rPr>
+              <a:t>Resumption token:</a:t>
+            </a:r>
+            <a:endParaRPr/>
+          </a:p>
+          <a:p>
+            <a:r>
+              <a:rPr lang="en-CA" sz="3000">
+                <a:solidFill>
+                  <a:srgbClr val="000096"/>
+                </a:solidFill>
+                <a:latin typeface="Times New Roman"/>
+                <a:ea typeface="Droid Sans Fallback"/>
+              </a:rPr>
+              <a:t>&lt;resumptionToken</a:t>
+            </a:r>
+            <a:r>
+              <a:rPr lang="en-CA" sz="3000">
+                <a:solidFill>
+                  <a:srgbClr val="f5844c"/>
+                </a:solidFill>
+                <a:latin typeface="Times New Roman"/>
+                <a:ea typeface="Droid Sans Fallback"/>
+              </a:rPr>
+              <a:t> completeListSize</a:t>
+            </a:r>
+            <a:r>
+              <a:rPr lang="en-CA" sz="3000">
+                <a:solidFill>
+                  <a:srgbClr val="ff8040"/>
+                </a:solidFill>
+                <a:latin typeface="Times New Roman"/>
+                <a:ea typeface="Droid Sans Fallback"/>
+              </a:rPr>
+              <a:t>=</a:t>
+            </a:r>
+            <a:r>
+              <a:rPr lang="en-CA" sz="3000">
+                <a:solidFill>
+                  <a:srgbClr val="993300"/>
+                </a:solidFill>
+                <a:latin typeface="Times New Roman"/>
+                <a:ea typeface="Droid Sans Fallback"/>
+              </a:rPr>
+              <a:t>"7154"</a:t>
+            </a:r>
+            <a:r>
+              <a:rPr lang="en-CA" sz="3000">
+                <a:solidFill>
+                  <a:srgbClr val="000096"/>
+                </a:solidFill>
+                <a:latin typeface="Times New Roman"/>
+                <a:ea typeface="Droid Sans Fallback"/>
+              </a:rPr>
+              <a:t>&gt;</a:t>
+            </a:r>
+            <a:endParaRPr/>
+          </a:p>
+          <a:p>
+            <a:r>
+              <a:rPr lang="en-CA" sz="3000">
+                <a:solidFill>
+                  <a:srgbClr val="000096"/>
+                </a:solidFill>
+                <a:latin typeface="Times New Roman"/>
+                <a:ea typeface="Droid Sans Fallback"/>
+              </a:rPr>
+              <a:t>    </a:t>
+            </a:r>
+            <a:r>
+              <a:rPr lang="en-CA" sz="3000">
+                <a:solidFill>
+                  <a:srgbClr val="000000"/>
+                </a:solidFill>
+                <a:latin typeface="Times New Roman"/>
+                <a:ea typeface="Droid Sans Fallback"/>
+              </a:rPr>
+              <a:t>from:2010-01-01;until:2020-01-01;set:;next:21</a:t>
+            </a:r>
+            <a:endParaRPr/>
+          </a:p>
+          <a:p>
+            <a:r>
+              <a:rPr lang="en-CA" sz="3000">
+                <a:solidFill>
+                  <a:srgbClr val="000080"/>
+                </a:solidFill>
+                <a:latin typeface="Arial"/>
+                <a:ea typeface="Droid Sans Fallback"/>
+              </a:rPr>
+              <a:t>&lt;/resumptionToken&gt;</a:t>
+            </a:r>
+            <a:endParaRPr/>
+          </a:p>
+        </p:txBody>
+      </p:sp>
+    </p:spTree>
+  </p:cSld>
+  <p:timing>
+    <p:tnLst>
+      <p:par>
+        <p:cTn id="85" dur="indefinite" restart="never" nodeType="tmRoot">
+          <p:childTnLst>
+            <p:seq>
+              <p:cTn id="86" nodeType="mainSeq"/>
+              <p:prevCondLst>
+                <p:cond delay="0" evt="onPrev">
+                  <p:tgtEl>
+                    <p:sldTgt/>
+                  </p:tgtEl>
+                </p:cond>
+              </p:prevCondLst>
+              <p:nextCondLst>
+                <p:cond delay="0" evt="onNext">
+                  <p:tgtEl>
+                    <p:sldTgt/>
+                  </p:tgtEl>
+                </p:cond>
+              </p:nextCondLst>
+            </p:seq>
+          </p:childTnLst>
+        </p:cTn>
+      </p:par>
+    </p:tnLst>
+  </p:timing>
+</p:sld>
+</file>
+
+<file path=ppt/slides/slide22.xml><?xml version="1.0" encoding="utf-8"?>
+<p:sld xmlns:a="http://schemas.openxmlformats.org/drawingml/2006/main" xmlns:p="http://schemas.openxmlformats.org/presentationml/2006/main" xmlns:r="http://schemas.openxmlformats.org/officeDocument/2006/relationships">
+  <p:cSld>
+    <p:spTree>
+      <p:nvGrpSpPr>
+        <p:cNvPr id="1" name=""/>
+        <p:cNvGrpSpPr/>
+        <p:nvPr/>
+      </p:nvGrpSpPr>
+      <p:grpSpPr>
+        <a:xfrm>
+          <a:off x="0" y="0"/>
+          <a:ext cx="0" cy="0"/>
+          <a:chOff x="0" y="0"/>
+          <a:chExt cx="0" cy="0"/>
+        </a:xfrm>
+      </p:grpSpPr>
+      <p:sp>
+        <p:nvSpPr>
+          <p:cNvPr id="127" name="TextShape 1"/>
+          <p:cNvSpPr txBox="1"/>
+          <p:nvPr/>
+        </p:nvSpPr>
+        <p:spPr>
+          <a:xfrm>
+            <a:off x="432000" y="648000"/>
+            <a:ext cx="7056000" cy="648000"/>
+          </a:xfrm>
+          <a:prstGeom prst="rect">
+            <a:avLst/>
+          </a:prstGeom>
+        </p:spPr>
+        <p:txBody>
+          <a:bodyPr lIns="0" rIns="0" tIns="0" bIns="0" anchor="ctr"/>
+          <a:p>
+            <a:r>
+              <a:rPr lang="en-CA" sz="3390">
+                <a:latin typeface="Arial"/>
+              </a:rPr>
+              <a:t>The nitty-gritty of CodeSharing</a:t>
+            </a:r>
+            <a:endParaRPr/>
+          </a:p>
+        </p:txBody>
+      </p:sp>
+      <p:sp>
+        <p:nvSpPr>
+          <p:cNvPr id="128" name="TextShape 2"/>
+          <p:cNvSpPr txBox="1"/>
+          <p:nvPr/>
+        </p:nvSpPr>
+        <p:spPr>
+          <a:xfrm>
+            <a:off x="504000" y="2095200"/>
+            <a:ext cx="8870040" cy="4384800"/>
+          </a:xfrm>
+          <a:prstGeom prst="rect">
+            <a:avLst/>
+          </a:prstGeom>
+        </p:spPr>
+        <p:txBody>
+          <a:bodyPr lIns="0" rIns="0" tIns="0" bIns="0"/>
+          <a:p>
+            <a:pPr>
+              <a:buSzPct val="45000"/>
+              <a:buFont typeface="StarSymbol"/>
+              <a:buChar char=""/>
+            </a:pPr>
+            <a:r>
+              <a:rPr lang="en-CA" sz="3600">
+                <a:latin typeface="DejaVu Sans Mono"/>
+              </a:rPr>
+              <a:t>codesharing?verb=</a:t>
+            </a:r>
+            <a:endParaRPr/>
+          </a:p>
+          <a:p>
+            <a:r>
+              <a:rPr lang="en-CA" sz="3600">
+                <a:latin typeface="DejaVu Sans Mono"/>
+              </a:rPr>
+              <a:t>identify</a:t>
+            </a:r>
+            <a:endParaRPr/>
+          </a:p>
+          <a:p>
+            <a:r>
+              <a:rPr lang="en-CA" sz="3600">
+                <a:latin typeface="DejaVu Sans Mono"/>
+              </a:rPr>
+              <a:t>listElements</a:t>
+            </a:r>
+            <a:endParaRPr/>
+          </a:p>
+          <a:p>
+            <a:r>
+              <a:rPr lang="en-CA" sz="3600">
+                <a:latin typeface="DejaVu Sans Mono"/>
+              </a:rPr>
+              <a:t>listAttributes</a:t>
+            </a:r>
+            <a:endParaRPr/>
+          </a:p>
+          <a:p>
+            <a:r>
+              <a:rPr lang="en-CA" sz="3600">
+                <a:latin typeface="DejaVu Sans Mono"/>
+              </a:rPr>
+              <a:t>listNamespaces</a:t>
+            </a:r>
+            <a:endParaRPr/>
+          </a:p>
+          <a:p>
+            <a:r>
+              <a:rPr lang="en-CA" sz="3600">
+                <a:latin typeface="DejaVu Sans Mono"/>
+              </a:rPr>
+              <a:t>listDocumentTypes</a:t>
+            </a:r>
+            <a:endParaRPr/>
+          </a:p>
+          <a:p>
+            <a:r>
+              <a:rPr lang="en-CA" sz="3600">
+                <a:latin typeface="DejaVu Sans Mono"/>
+              </a:rPr>
+              <a:t>getExamples</a:t>
+            </a:r>
+            <a:endParaRPr/>
+          </a:p>
+          <a:p>
+            <a:pPr lvl="1">
+              <a:buSzPct val="75000"/>
+              <a:buFont typeface="StarSymbol"/>
+              <a:buChar char=""/>
+            </a:pPr>
+            <a:endParaRPr/>
+          </a:p>
+        </p:txBody>
+      </p:sp>
+    </p:spTree>
+  </p:cSld>
+  <p:timing>
+    <p:tnLst>
+      <p:par>
+        <p:cTn id="87" dur="indefinite" restart="never" nodeType="tmRoot">
+          <p:childTnLst>
+            <p:seq>
+              <p:cTn id="88" nodeType="mainSeq"/>
+              <p:prevCondLst>
+                <p:cond delay="0" evt="onPrev">
+                  <p:tgtEl>
+                    <p:sldTgt/>
+                  </p:tgtEl>
+                </p:cond>
+              </p:prevCondLst>
+              <p:nextCondLst>
+                <p:cond delay="0" evt="onNext">
+                  <p:tgtEl>
+                    <p:sldTgt/>
+                  </p:tgtEl>
+                </p:cond>
+              </p:nextCondLst>
+            </p:seq>
+          </p:childTnLst>
+        </p:cTn>
+      </p:par>
+    </p:tnLst>
+  </p:timing>
+</p:sld>
+</file>
+
+<file path=ppt/slides/slide23.xml><?xml version="1.0" encoding="utf-8"?>
+<p:sld xmlns:a="http://schemas.openxmlformats.org/drawingml/2006/main" xmlns:p="http://schemas.openxmlformats.org/presentationml/2006/main" xmlns:r="http://schemas.openxmlformats.org/officeDocument/2006/relationships">
+  <p:cSld>
+    <p:spTree>
+      <p:nvGrpSpPr>
+        <p:cNvPr id="1" name=""/>
+        <p:cNvGrpSpPr/>
+        <p:nvPr/>
+      </p:nvGrpSpPr>
+      <p:grpSpPr>
+        <a:xfrm>
+          <a:off x="0" y="0"/>
+          <a:ext cx="0" cy="0"/>
+          <a:chOff x="0" y="0"/>
+          <a:chExt cx="0" cy="0"/>
+        </a:xfrm>
+      </p:grpSpPr>
+      <p:sp>
+        <p:nvSpPr>
+          <p:cNvPr id="129" name="TextShape 1"/>
+          <p:cNvSpPr txBox="1"/>
+          <p:nvPr/>
+        </p:nvSpPr>
+        <p:spPr>
+          <a:xfrm>
+            <a:off x="432000" y="648000"/>
+            <a:ext cx="7056000" cy="648000"/>
+          </a:xfrm>
+          <a:prstGeom prst="rect">
+            <a:avLst/>
+          </a:prstGeom>
+        </p:spPr>
+        <p:txBody>
+          <a:bodyPr lIns="0" rIns="0" tIns="0" bIns="0" anchor="ctr"/>
+          <a:p>
+            <a:r>
+              <a:rPr lang="en-CA" sz="3390">
+                <a:latin typeface="Arial"/>
+              </a:rPr>
+              <a:t>The nitty-gritty of CodeSharing</a:t>
+            </a:r>
+            <a:endParaRPr/>
+          </a:p>
+        </p:txBody>
+      </p:sp>
+      <p:sp>
+        <p:nvSpPr>
+          <p:cNvPr id="130" name="TextShape 2"/>
+          <p:cNvSpPr txBox="1"/>
+          <p:nvPr/>
+        </p:nvSpPr>
+        <p:spPr>
+          <a:xfrm>
+            <a:off x="504000" y="1872000"/>
+            <a:ext cx="8870040" cy="4896000"/>
+          </a:xfrm>
+          <a:prstGeom prst="rect">
+            <a:avLst/>
+          </a:prstGeom>
+        </p:spPr>
+        <p:txBody>
+          <a:bodyPr lIns="0" rIns="0" tIns="0" bIns="0"/>
+          <a:p>
+            <a:pPr>
+              <a:buSzPct val="45000"/>
+              <a:buFont typeface="StarSymbol"/>
+              <a:buChar char=""/>
+            </a:pPr>
+            <a:r>
+              <a:rPr lang="en-CA" sz="3600">
+                <a:latin typeface="DejaVu Sans Mono"/>
+              </a:rPr>
+              <a:t>codesharing?</a:t>
+            </a:r>
+            <a:r>
+              <a:rPr lang="en-CA" sz="3600">
+                <a:solidFill>
+                  <a:srgbClr val="ff0000"/>
+                </a:solidFill>
+                <a:latin typeface="DejaVu Sans Mono"/>
+              </a:rPr>
+              <a:t>verb</a:t>
+            </a:r>
+            <a:r>
+              <a:rPr lang="en-CA" sz="3600">
+                <a:latin typeface="DejaVu Sans Mono"/>
+              </a:rPr>
+              <a:t>=</a:t>
+            </a:r>
+            <a:r>
+              <a:rPr lang="en-CA" sz="3600">
+                <a:solidFill>
+                  <a:srgbClr val="0000ff"/>
+                </a:solidFill>
+                <a:latin typeface="DejaVu Sans Mono"/>
+              </a:rPr>
+              <a:t>getExamples</a:t>
+            </a:r>
+            <a:endParaRPr/>
+          </a:p>
+          <a:p>
+            <a:r>
+              <a:rPr lang="en-CA" sz="3600">
+                <a:latin typeface="DejaVu Sans Mono"/>
+              </a:rPr>
+              <a:t>&amp;</a:t>
+            </a:r>
+            <a:r>
+              <a:rPr lang="en-CA" sz="3600">
+                <a:solidFill>
+                  <a:srgbClr val="ff0000"/>
+                </a:solidFill>
+                <a:latin typeface="DejaVu Sans Mono"/>
+              </a:rPr>
+              <a:t>elementName</a:t>
+            </a:r>
+            <a:r>
+              <a:rPr lang="en-CA" sz="3600">
+                <a:latin typeface="DejaVu Sans Mono"/>
+              </a:rPr>
+              <a:t>=</a:t>
+            </a:r>
+            <a:endParaRPr/>
+          </a:p>
+          <a:p>
+            <a:r>
+              <a:rPr lang="en-CA" sz="3600">
+                <a:latin typeface="DejaVu Sans Mono"/>
+              </a:rPr>
+              <a:t>&amp;</a:t>
+            </a:r>
+            <a:r>
+              <a:rPr lang="en-CA" sz="3600">
+                <a:solidFill>
+                  <a:srgbClr val="ff0000"/>
+                </a:solidFill>
+                <a:latin typeface="DejaVu Sans Mono"/>
+              </a:rPr>
+              <a:t>attributeName</a:t>
+            </a:r>
+            <a:r>
+              <a:rPr lang="en-CA" sz="3600">
+                <a:latin typeface="DejaVu Sans Mono"/>
+              </a:rPr>
+              <a:t>=</a:t>
+            </a:r>
+            <a:endParaRPr/>
+          </a:p>
+          <a:p>
+            <a:r>
+              <a:rPr lang="en-CA" sz="3600">
+                <a:latin typeface="DejaVu Sans Mono"/>
+              </a:rPr>
+              <a:t>&amp;</a:t>
+            </a:r>
+            <a:r>
+              <a:rPr lang="en-CA" sz="3600">
+                <a:solidFill>
+                  <a:srgbClr val="ff0000"/>
+                </a:solidFill>
+                <a:latin typeface="DejaVu Sans Mono"/>
+              </a:rPr>
+              <a:t>attributeValue</a:t>
+            </a:r>
+            <a:r>
+              <a:rPr lang="en-CA" sz="3600">
+                <a:latin typeface="DejaVu Sans Mono"/>
+              </a:rPr>
+              <a:t>=</a:t>
+            </a:r>
+            <a:endParaRPr/>
+          </a:p>
+          <a:p>
+            <a:r>
+              <a:rPr lang="en-CA" sz="3600">
+                <a:latin typeface="DejaVu Sans Mono"/>
+              </a:rPr>
+              <a:t>&amp;</a:t>
+            </a:r>
+            <a:r>
+              <a:rPr lang="en-CA" sz="3600">
+                <a:solidFill>
+                  <a:srgbClr val="ff0000"/>
+                </a:solidFill>
+                <a:latin typeface="DejaVu Sans Mono"/>
+              </a:rPr>
+              <a:t>namespace</a:t>
+            </a:r>
+            <a:r>
+              <a:rPr lang="en-CA" sz="3600">
+                <a:latin typeface="DejaVu Sans Mono"/>
+              </a:rPr>
+              <a:t>=</a:t>
+            </a:r>
+            <a:endParaRPr/>
+          </a:p>
+          <a:p>
+            <a:r>
+              <a:rPr lang="en-CA" sz="3600">
+                <a:latin typeface="DejaVu Sans Mono"/>
+              </a:rPr>
+              <a:t>&amp;</a:t>
+            </a:r>
+            <a:r>
+              <a:rPr lang="en-CA" sz="3600">
+                <a:solidFill>
+                  <a:srgbClr val="ff0000"/>
+                </a:solidFill>
+                <a:latin typeface="DejaVu Sans Mono"/>
+              </a:rPr>
+              <a:t>wrapped</a:t>
+            </a:r>
+            <a:r>
+              <a:rPr lang="en-CA" sz="3600">
+                <a:latin typeface="DejaVu Sans Mono"/>
+              </a:rPr>
+              <a:t>=</a:t>
+            </a:r>
+            <a:endParaRPr/>
+          </a:p>
+          <a:p>
+            <a:r>
+              <a:rPr lang="en-CA" sz="3600">
+                <a:latin typeface="DejaVu Sans Mono"/>
+              </a:rPr>
+              <a:t>&amp;</a:t>
+            </a:r>
+            <a:r>
+              <a:rPr lang="en-CA" sz="3600">
+                <a:solidFill>
+                  <a:srgbClr val="ff0000"/>
+                </a:solidFill>
+                <a:latin typeface="DejaVu Sans Mono"/>
+              </a:rPr>
+              <a:t>maxItemsPerPage</a:t>
+            </a:r>
+            <a:r>
+              <a:rPr lang="en-CA" sz="3600">
+                <a:latin typeface="DejaVu Sans Mono"/>
+              </a:rPr>
+              <a:t>=</a:t>
+            </a:r>
+            <a:endParaRPr/>
+          </a:p>
+          <a:p>
+            <a:endParaRPr/>
+          </a:p>
+          <a:p>
+            <a:pPr lvl="1">
+              <a:buSzPct val="75000"/>
+              <a:buFont typeface="StarSymbol"/>
+              <a:buChar char=""/>
+            </a:pPr>
+            <a:endParaRPr/>
+          </a:p>
+        </p:txBody>
+      </p:sp>
+    </p:spTree>
+  </p:cSld>
+  <p:timing>
+    <p:tnLst>
+      <p:par>
+        <p:cTn id="89" dur="indefinite" restart="never" nodeType="tmRoot">
+          <p:childTnLst>
+            <p:seq>
+              <p:cTn id="90" nodeType="mainSeq"/>
+              <p:prevCondLst>
+                <p:cond delay="0" evt="onPrev">
+                  <p:tgtEl>
+                    <p:sldTgt/>
+                  </p:tgtEl>
+                </p:cond>
+              </p:prevCondLst>
+              <p:nextCondLst>
+                <p:cond delay="0" evt="onNext">
+                  <p:tgtEl>
+                    <p:sldTgt/>
+                  </p:tgtEl>
+                </p:cond>
+              </p:nextCondLst>
+            </p:seq>
+          </p:childTnLst>
+        </p:cTn>
+      </p:par>
+    </p:tnLst>
+  </p:timing>
+</p:sld>
+</file>
+
+<file path=ppt/slides/slide24.xml><?xml version="1.0" encoding="utf-8"?>
+<p:sld xmlns:a="http://schemas.openxmlformats.org/drawingml/2006/main" xmlns:p="http://schemas.openxmlformats.org/presentationml/2006/main" xmlns:r="http://schemas.openxmlformats.org/officeDocument/2006/relationships">
+  <p:cSld>
+    <p:spTree>
+      <p:nvGrpSpPr>
+        <p:cNvPr id="1" name=""/>
+        <p:cNvGrpSpPr/>
+        <p:nvPr/>
+      </p:nvGrpSpPr>
+      <p:grpSpPr>
+        <a:xfrm>
+          <a:off x="0" y="0"/>
+          <a:ext cx="0" cy="0"/>
+          <a:chOff x="0" y="0"/>
+          <a:chExt cx="0" cy="0"/>
+        </a:xfrm>
+      </p:grpSpPr>
+      <p:sp>
+        <p:nvSpPr>
+          <p:cNvPr id="131" name="TextShape 1"/>
+          <p:cNvSpPr txBox="1"/>
+          <p:nvPr/>
+        </p:nvSpPr>
+        <p:spPr>
+          <a:xfrm>
+            <a:off x="432000" y="648000"/>
+            <a:ext cx="7056000" cy="648000"/>
+          </a:xfrm>
+          <a:prstGeom prst="rect">
+            <a:avLst/>
+          </a:prstGeom>
+        </p:spPr>
+        <p:txBody>
+          <a:bodyPr lIns="0" rIns="0" tIns="0" bIns="0" anchor="ctr"/>
+          <a:p>
+            <a:r>
+              <a:rPr lang="en-CA" sz="3390">
+                <a:latin typeface="Arial"/>
+              </a:rPr>
+              <a:t>The nitty-gritty of CodeSharing</a:t>
+            </a:r>
+            <a:endParaRPr/>
+          </a:p>
+        </p:txBody>
+      </p:sp>
+      <p:sp>
+        <p:nvSpPr>
+          <p:cNvPr id="132" name="TextShape 2"/>
+          <p:cNvSpPr txBox="1"/>
+          <p:nvPr/>
+        </p:nvSpPr>
+        <p:spPr>
+          <a:xfrm>
+            <a:off x="504360" y="2520000"/>
+            <a:ext cx="8870040" cy="3960000"/>
+          </a:xfrm>
+          <a:prstGeom prst="rect">
+            <a:avLst/>
+          </a:prstGeom>
+        </p:spPr>
+        <p:txBody>
+          <a:bodyPr lIns="0" rIns="0" tIns="0" bIns="0"/>
+          <a:p>
+            <a:pPr>
+              <a:buSzPct val="45000"/>
+              <a:buFont typeface="StarSymbol"/>
+              <a:buChar char=""/>
+            </a:pPr>
+            <a:r>
+              <a:rPr lang="en-CA" sz="2600">
+                <a:latin typeface="Arial"/>
+              </a:rPr>
+              <a:t>Response: </a:t>
+            </a:r>
+            <a:endParaRPr/>
+          </a:p>
+          <a:p>
+            <a:pPr lvl="1">
+              <a:buSzPct val="75000"/>
+              <a:buFont typeface="StarSymbol"/>
+              <a:buChar char=""/>
+            </a:pPr>
+            <a:r>
+              <a:rPr lang="en-CA" sz="2600">
+                <a:latin typeface="Arial"/>
+              </a:rPr>
+              <a:t>a TEI XML file</a:t>
+            </a:r>
+            <a:endParaRPr/>
+          </a:p>
+          <a:p>
+            <a:pPr lvl="1">
+              <a:buSzPct val="75000"/>
+              <a:buFont typeface="StarSymbol"/>
+              <a:buChar char=""/>
+            </a:pPr>
+            <a:r>
+              <a:rPr lang="en-CA" sz="2600">
+                <a:latin typeface="Arial"/>
+              </a:rPr>
+              <a:t>results in the &lt;body&gt;</a:t>
+            </a:r>
+            <a:endParaRPr/>
+          </a:p>
+          <a:p>
+            <a:pPr lvl="1">
+              <a:buSzPct val="75000"/>
+              <a:buFont typeface="StarSymbol"/>
+              <a:buChar char=""/>
+            </a:pPr>
+            <a:r>
+              <a:rPr lang="en-CA" sz="2600">
+                <a:latin typeface="Arial"/>
+              </a:rPr>
+              <a:t>settings and resumption URIs in the &lt;front&gt;</a:t>
+            </a:r>
+            <a:endParaRPr/>
+          </a:p>
+          <a:p>
+            <a:pPr>
+              <a:buSzPct val="45000"/>
+              <a:buFont typeface="StarSymbol"/>
+              <a:buChar char=""/>
+            </a:pPr>
+            <a:r>
+              <a:rPr lang="en-CA" sz="2000">
+                <a:latin typeface="Arial"/>
+              </a:rPr>
+              <a:t>http://mapoflondon.uvic.ca/codesharing?verb=listElements</a:t>
+            </a:r>
+            <a:endParaRPr/>
+          </a:p>
+          <a:p>
+            <a:pPr>
+              <a:buSzPct val="45000"/>
+              <a:buFont typeface="StarSymbol"/>
+              <a:buChar char=""/>
+            </a:pPr>
+            <a:r>
+              <a:rPr lang="en-CA" sz="2000">
+                <a:latin typeface="Arial"/>
+              </a:rPr>
+              <a:t>http://mapoflondon.uvic.ca/codesharing?verb=listAttributes</a:t>
+            </a:r>
+            <a:endParaRPr/>
+          </a:p>
+          <a:p>
+            <a:pPr>
+              <a:buSzPct val="45000"/>
+              <a:buFont typeface="StarSymbol"/>
+              <a:buChar char=""/>
+            </a:pPr>
+            <a:r>
+              <a:rPr lang="en-CA" sz="2000">
+                <a:latin typeface="Arial"/>
+              </a:rPr>
+              <a:t>http:...?verb=getExamples&amp;elementName=date</a:t>
+            </a:r>
+            <a:endParaRPr/>
+          </a:p>
+          <a:p>
+            <a:pPr>
+              <a:buSzPct val="45000"/>
+              <a:buFont typeface="StarSymbol"/>
+              <a:buChar char=""/>
+            </a:pPr>
+            <a:endParaRPr/>
+          </a:p>
+        </p:txBody>
+      </p:sp>
+    </p:spTree>
+  </p:cSld>
+  <p:timing>
+    <p:tnLst>
+      <p:par>
+        <p:cTn id="91" dur="indefinite" restart="never" nodeType="tmRoot">
+          <p:childTnLst>
+            <p:seq>
+              <p:cTn id="92" nodeType="mainSeq"/>
+              <p:prevCondLst>
+                <p:cond delay="0" evt="onPrev">
+                  <p:tgtEl>
+                    <p:sldTgt/>
+                  </p:tgtEl>
+                </p:cond>
+              </p:prevCondLst>
+              <p:nextCondLst>
+                <p:cond delay="0" evt="onNext">
+                  <p:tgtEl>
+                    <p:sldTgt/>
+                  </p:tgtEl>
+                </p:cond>
+              </p:nextCondLst>
+            </p:seq>
+          </p:childTnLst>
+        </p:cTn>
+      </p:par>
+    </p:tnLst>
+  </p:timing>
+</p:sld>
+</file>
+
 <file path=ppt/slides/slide25.xml><?xml version="1.0" encoding="utf-8"?>
 <p:sld xmlns:a="http://schemas.openxmlformats.org/drawingml/2006/main" xmlns:p="http://schemas.openxmlformats.org/presentationml/2006/main" xmlns:r="http://schemas.openxmlformats.org/officeDocument/2006/relationships">
   <p:cSld>
@@ -6045,7 +5936,7 @@
               <a:rPr lang="en-CA" sz="3390">
                 <a:latin typeface="Arial"/>
               </a:rPr>
-              <a:t>The nitty-gritty of CodeSharing</a:t>
+              <a:t>A sample implementation</a:t>
             </a:r>
             <a:endParaRPr/>
           </a:p>
@@ -6059,8 +5950,8 @@
         </p:nvSpPr>
         <p:spPr>
           <a:xfrm>
-            <a:off x="504360" y="2520000"/>
-            <a:ext cx="8870040" cy="3960000"/>
+            <a:off x="504000" y="2095200"/>
+            <a:ext cx="8870040" cy="4384800"/>
           </a:xfrm>
           <a:prstGeom prst="rect">
             <a:avLst/>
@@ -6078,49 +5969,27 @@
               <a:rPr lang="en-CA" sz="2600">
                 <a:latin typeface="Arial"/>
               </a:rPr>
-              <a:t>Response: </a:t>
-            </a:r>
-            <a:endParaRPr/>
-          </a:p>
-          <a:p>
-            <a:pPr lvl="1">
-              <a:buSzPct val="75000"/>
-              <a:buFont typeface="StarSymbol"/>
-              <a:buChar char=""/>
-            </a:pPr>
+              <a:t>The sample implementation is running here:</a:t>
+            </a:r>
             <a:r>
               <a:rPr lang="en-CA" sz="2600">
                 <a:latin typeface="Arial"/>
               </a:rPr>
-              <a:t>a TEI XML file</a:t>
-            </a:r>
-            <a:endParaRPr/>
-          </a:p>
-          <a:p>
-            <a:pPr lvl="1">
-              <a:buSzPct val="75000"/>
-              <a:buFont typeface="StarSymbol"/>
-              <a:buChar char=""/>
-            </a:pPr>
+              <a:t>
+</a:t>
+            </a:r>
             <a:r>
               <a:rPr lang="en-CA" sz="2600">
                 <a:latin typeface="Arial"/>
               </a:rPr>
-              <a:t>results in the &lt;body&gt;</a:t>
-            </a:r>
-            <a:endParaRPr/>
-          </a:p>
-          <a:p>
-            <a:pPr lvl="1">
-              <a:buSzPct val="75000"/>
-              <a:buFont typeface="StarSymbol"/>
-              <a:buChar char=""/>
-            </a:pPr>
+              <a:t>
+</a:t>
+            </a:r>
             <a:r>
               <a:rPr lang="en-CA" sz="2600">
                 <a:latin typeface="Arial"/>
               </a:rPr>
-              <a:t>settings and resumption URIs in the &lt;front&gt;</a:t>
+              <a:t>http://mapoflondon.uvic.ca/codesharing</a:t>
             </a:r>
             <a:endParaRPr/>
           </a:p>
@@ -6130,12 +5999,6 @@
               <a:buFont typeface="StarSymbol"/>
               <a:buChar char=""/>
             </a:pPr>
-            <a:r>
-              <a:rPr lang="en-CA" sz="2000">
-                <a:latin typeface="Arial"/>
-              </a:rPr>
-              <a:t>http://mapoflondon.uvic.ca/codesharing?verb=listElements</a:t>
-            </a:r>
             <a:endParaRPr/>
           </a:p>
           <a:p>
@@ -6145,10 +6008,30 @@
               <a:buChar char=""/>
             </a:pPr>
             <a:r>
-              <a:rPr lang="en-CA" sz="2000">
-                <a:latin typeface="Arial"/>
-              </a:rPr>
-              <a:t>http://mapoflondon.uvic.ca/codesharing?verb=listAttributes</a:t>
+              <a:rPr lang="en-CA" sz="2600">
+                <a:latin typeface="Arial"/>
+              </a:rPr>
+              <a:t>There is a human-friendly interface here:</a:t>
+            </a:r>
+            <a:r>
+              <a:rPr lang="en-CA" sz="2600">
+                <a:latin typeface="Arial"/>
+              </a:rPr>
+              <a:t>
+</a:t>
+            </a:r>
+            <a:r>
+              <a:rPr lang="en-CA" sz="2600">
+                <a:latin typeface="Arial"/>
+              </a:rPr>
+              <a:t>
+</a:t>
+            </a:r>
+            <a:r>
+              <a:rPr lang="en-CA" sz="2600">
+                <a:latin typeface="Arial"/>
+              </a:rPr>
+              <a:t>http://mapoflondon.uvic.ca/codesharing.htm</a:t>
             </a:r>
             <a:endParaRPr/>
           </a:p>
@@ -6158,20 +6041,6 @@
               <a:buFont typeface="StarSymbol"/>
               <a:buChar char=""/>
             </a:pPr>
-            <a:r>
-              <a:rPr lang="en-CA" sz="2000">
-                <a:latin typeface="Arial"/>
-              </a:rPr>
-              <a:t>http:...?verb=getExamples&amp;elementName=date</a:t>
-            </a:r>
-            <a:endParaRPr/>
-          </a:p>
-          <a:p>
-            <a:pPr>
-              <a:buSzPct val="45000"/>
-              <a:buFont typeface="StarSymbol"/>
-              <a:buChar char=""/>
-            </a:pPr>
             <a:endParaRPr/>
           </a:p>
         </p:txBody>
@@ -6181,10 +6050,10 @@
   <p:timing>
     <p:tnLst>
       <p:par>
-        <p:cTn id="81" dur="indefinite" restart="never" nodeType="tmRoot">
+        <p:cTn id="93" dur="indefinite" restart="never" nodeType="tmRoot">
           <p:childTnLst>
             <p:seq>
-              <p:cTn id="82" nodeType="mainSeq"/>
+              <p:cTn id="94" nodeType="mainSeq"/>
               <p:prevCondLst>
                 <p:cond delay="0" evt="onPrev">
                   <p:tgtEl>
@@ -6247,124 +6116,46 @@
               <a:rPr lang="en-CA" sz="3390">
                 <a:latin typeface="Arial"/>
               </a:rPr>
-              <a:t>A sample implementation</a:t>
-            </a:r>
-            <a:endParaRPr/>
-          </a:p>
-        </p:txBody>
-      </p:sp>
-      <p:sp>
-        <p:nvSpPr>
-          <p:cNvPr id="136" name="TextShape 2"/>
-          <p:cNvSpPr txBox="1"/>
+              <a:t>Imagining a harvester</a:t>
+            </a:r>
+            <a:endParaRPr/>
+          </a:p>
+        </p:txBody>
+      </p:sp>
+      <p:pic>
+        <p:nvPicPr>
+          <p:cNvPr id="136" name="" descr=""/>
+          <p:cNvPicPr/>
           <p:nvPr/>
-        </p:nvSpPr>
-        <p:spPr>
-          <a:xfrm>
-            <a:off x="504000" y="2095200"/>
-            <a:ext cx="8870040" cy="4384800"/>
-          </a:xfrm>
-          <a:prstGeom prst="rect">
-            <a:avLst/>
-          </a:prstGeom>
-        </p:spPr>
-        <p:txBody>
-          <a:bodyPr lIns="0" rIns="0" tIns="0" bIns="0"/>
-          <a:p>
-            <a:pPr>
-              <a:buSzPct val="45000"/>
-              <a:buFont typeface="StarSymbol"/>
-              <a:buChar char=""/>
-            </a:pPr>
-            <a:r>
-              <a:rPr lang="en-CA" sz="2600">
-                <a:latin typeface="Arial"/>
-              </a:rPr>
-              <a:t>The sample implementation is running here:</a:t>
-            </a:r>
-            <a:r>
-              <a:rPr lang="en-CA" sz="2600">
-                <a:latin typeface="Arial"/>
-              </a:rPr>
-              <a:t>
-</a:t>
-            </a:r>
-            <a:r>
-              <a:rPr lang="en-CA" sz="2600">
-                <a:latin typeface="Arial"/>
-              </a:rPr>
-              <a:t>
-</a:t>
-            </a:r>
-            <a:r>
-              <a:rPr lang="en-CA" sz="2600">
-                <a:latin typeface="Arial"/>
-              </a:rPr>
-              <a:t>http://mapoflondon.uvic.ca/codesharing</a:t>
-            </a:r>
-            <a:endParaRPr/>
-          </a:p>
-          <a:p>
-            <a:pPr>
-              <a:buSzPct val="45000"/>
-              <a:buFont typeface="StarSymbol"/>
-              <a:buChar char=""/>
-            </a:pPr>
-            <a:endParaRPr/>
-          </a:p>
-          <a:p>
-            <a:pPr>
-              <a:buSzPct val="45000"/>
-              <a:buFont typeface="StarSymbol"/>
-              <a:buChar char=""/>
-            </a:pPr>
-            <a:r>
-              <a:rPr lang="en-CA" sz="2600">
-                <a:latin typeface="Arial"/>
-              </a:rPr>
-              <a:t>There is a human-friendly interface here:</a:t>
-            </a:r>
-            <a:r>
-              <a:rPr lang="en-CA" sz="2600">
-                <a:latin typeface="Arial"/>
-              </a:rPr>
-              <a:t>
-</a:t>
-            </a:r>
-            <a:r>
-              <a:rPr lang="en-CA" sz="2600">
-                <a:latin typeface="Arial"/>
-              </a:rPr>
-              <a:t>
-</a:t>
-            </a:r>
-            <a:r>
-              <a:rPr lang="en-CA" sz="2600">
-                <a:latin typeface="Arial"/>
-              </a:rPr>
-              <a:t>http://mapoflondon.uvic.ca/codesharing.htm</a:t>
-            </a:r>
-            <a:endParaRPr/>
-          </a:p>
-          <a:p>
-            <a:pPr>
-              <a:buSzPct val="45000"/>
-              <a:buFont typeface="StarSymbol"/>
-              <a:buChar char=""/>
-            </a:pPr>
-            <a:endParaRPr/>
-          </a:p>
-        </p:txBody>
-      </p:sp>
+        </p:nvPicPr>
+        <p:blipFill>
+          <a:blip r:embed="rId1"/>
+          <a:stretch>
+            <a:fillRect/>
+          </a:stretch>
+        </p:blipFill>
+        <p:spPr>
+          <a:xfrm>
+            <a:off x="450000" y="1703520"/>
+            <a:ext cx="9126000" cy="5465160"/>
+          </a:xfrm>
+          <a:prstGeom prst="rect">
+            <a:avLst/>
+          </a:prstGeom>
+          <a:ln>
+            <a:noFill/>
+          </a:ln>
+        </p:spPr>
+      </p:pic>
     </p:spTree>
   </p:cSld>
   <p:timing>
     <p:tnLst>
       <p:par>
-        <p:cTn id="83" dur="indefinite" restart="never" nodeType="tmRoot">
+        <p:cTn id="95" dur="indefinite" restart="never" nodeType="tmRoot">
           <p:childTnLst>
             <p:seq>
-              <p:cTn id="84" nodeType="mainSeq"/>
+              <p:cTn id="96" nodeType="mainSeq"/>
               <p:prevCondLst>
                 <p:cond delay="0" evt="onPrev">
                   <p:tgtEl>
@@ -6463,10 +6254,10 @@
   <p:timing>
     <p:tnLst>
       <p:par>
-        <p:cTn id="85" dur="indefinite" restart="never" nodeType="tmRoot">
+        <p:cTn id="97" dur="indefinite" restart="never" nodeType="tmRoot">
           <p:childTnLst>
             <p:seq>
-              <p:cTn id="86" nodeType="mainSeq"/>
+              <p:cTn id="98" nodeType="mainSeq"/>
               <p:prevCondLst>
                 <p:cond delay="0" evt="onPrev">
                   <p:tgtEl>
@@ -6565,10 +6356,10 @@
   <p:timing>
     <p:tnLst>
       <p:par>
-        <p:cTn id="87" dur="indefinite" restart="never" nodeType="tmRoot">
+        <p:cTn id="99" dur="indefinite" restart="never" nodeType="tmRoot">
           <p:childTnLst>
             <p:seq>
-              <p:cTn id="88" nodeType="mainSeq"/>
+              <p:cTn id="100" nodeType="mainSeq"/>
               <p:prevCondLst>
                 <p:cond delay="0" evt="onPrev">
                   <p:tgtEl>
@@ -6667,10 +6458,10 @@
   <p:timing>
     <p:tnLst>
       <p:par>
-        <p:cTn id="89" dur="indefinite" restart="never" nodeType="tmRoot">
+        <p:cTn id="101" dur="indefinite" restart="never" nodeType="tmRoot">
           <p:childTnLst>
             <p:seq>
-              <p:cTn id="90" nodeType="mainSeq"/>
+              <p:cTn id="102" nodeType="mainSeq"/>
               <p:prevCondLst>
                 <p:cond delay="0" evt="onPrev">
                   <p:tgtEl>
@@ -6791,32 +6582,32 @@
   <p:timing>
     <p:tnLst>
       <p:par>
-        <p:cTn id="5" dur="indefinite" restart="never" nodeType="tmRoot">
+        <p:cTn id="21" dur="indefinite" restart="never" nodeType="tmRoot">
           <p:childTnLst>
             <p:seq>
-              <p:cTn id="6" nodeType="mainSeq">
+              <p:cTn id="22" nodeType="mainSeq">
                 <p:childTnLst>
                   <p:par>
-                    <p:cTn id="7" fill="freeze">
+                    <p:cTn id="23" fill="freeze">
                       <p:stCondLst>
                         <p:cond delay="indefinite"/>
                       </p:stCondLst>
                       <p:childTnLst>
                         <p:par>
-                          <p:cTn id="8" fill="freeze">
+                          <p:cTn id="24" fill="freeze">
                             <p:stCondLst>
                               <p:cond delay="0"/>
                             </p:stCondLst>
                             <p:childTnLst>
                               <p:par>
-                                <p:cTn id="9" nodeType="clickEffect" fill="hold" presetClass="entr" presetID="1">
+                                <p:cTn id="25" nodeType="clickEffect" fill="hold" presetClass="entr" presetID="1">
                                   <p:stCondLst>
                                     <p:cond delay="0"/>
                                   </p:stCondLst>
                                   <p:childTnLst>
                                     <p:set>
                                       <p:cBhvr>
-                                        <p:cTn id="10" dur="1" fill="hold">
+                                        <p:cTn id="26" dur="1" fill="hold">
                                           <p:stCondLst>
                                             <p:cond delay="0"/>
                                           </p:stCondLst>
@@ -6825,6 +6616,55 @@
                                           <p:spTgt spid="89">
                                             <p:txEl>
                                               <p:pRg st="0" end="16"/>
+                                            </p:txEl>
+                                          </p:spTgt>
+                                        </p:tgtEl>
+                                        <p:attrNameLst>
+                                          <p:attrName>style.visibility</p:attrName>
+                                        </p:attrNameLst>
+                                      </p:cBhvr>
+                                      <p:to>
+                                        <p:strVal val="visible"/>
+                                      </p:to>
+                                    </p:set>
+                                  </p:childTnLst>
+                                </p:cTn>
+                              </p:par>
+                            </p:childTnLst>
+                          </p:cTn>
+                        </p:par>
+                      </p:childTnLst>
+                    </p:cTn>
+                  </p:par>
+                  <p:par>
+                    <p:cTn id="27" fill="freeze">
+                      <p:stCondLst>
+                        <p:cond delay="indefinite"/>
+                      </p:stCondLst>
+                      <p:childTnLst>
+                        <p:par>
+                          <p:cTn id="28" fill="freeze">
+                            <p:stCondLst>
+                              <p:cond delay="0"/>
+                            </p:stCondLst>
+                            <p:childTnLst>
+                              <p:par>
+                                <p:cTn id="29" nodeType="clickEffect" fill="hold" presetClass="entr" presetID="1">
+                                  <p:stCondLst>
+                                    <p:cond delay="0"/>
+                                  </p:stCondLst>
+                                  <p:childTnLst>
+                                    <p:set>
+                                      <p:cBhvr>
+                                        <p:cTn id="30" dur="1" fill="hold">
+                                          <p:stCondLst>
+                                            <p:cond delay="0"/>
+                                          </p:stCondLst>
+                                        </p:cTn>
+                                        <p:tgtEl>
+                                          <p:spTgt spid="89">
+                                            <p:txEl>
+                                              <p:pRg st="16" end="52"/>
                                             </p:txEl>
                                           </p:spTgt>
                                         </p:tgtEl>
@@ -6945,10 +6785,10 @@
   <p:timing>
     <p:tnLst>
       <p:par>
-        <p:cTn id="91" dur="indefinite" restart="never" nodeType="tmRoot">
+        <p:cTn id="103" dur="indefinite" restart="never" nodeType="tmRoot">
           <p:childTnLst>
             <p:seq>
-              <p:cTn id="92" nodeType="mainSeq"/>
+              <p:cTn id="104" nodeType="mainSeq"/>
               <p:prevCondLst>
                 <p:cond delay="0" evt="onPrev">
                   <p:tgtEl>
@@ -7011,46 +6851,96 @@
               <a:rPr lang="en-CA" sz="3390">
                 <a:latin typeface="Arial"/>
               </a:rPr>
-              <a:t>Imagining a harvester</a:t>
-            </a:r>
-            <a:endParaRPr/>
-          </a:p>
-        </p:txBody>
-      </p:sp>
-      <p:pic>
-        <p:nvPicPr>
-          <p:cNvPr id="146" name="" descr=""/>
-          <p:cNvPicPr/>
+              <a:t>The state of play</a:t>
+            </a:r>
+            <a:endParaRPr/>
+          </a:p>
+        </p:txBody>
+      </p:sp>
+      <p:sp>
+        <p:nvSpPr>
+          <p:cNvPr id="146" name="TextShape 2"/>
+          <p:cNvSpPr txBox="1"/>
           <p:nvPr/>
-        </p:nvPicPr>
-        <p:blipFill>
-          <a:blip r:embed="rId1"/>
-          <a:stretch>
-            <a:fillRect/>
-          </a:stretch>
-        </p:blipFill>
-        <p:spPr>
-          <a:xfrm>
-            <a:off x="450000" y="1703520"/>
-            <a:ext cx="9126000" cy="5465160"/>
-          </a:xfrm>
-          <a:prstGeom prst="rect">
-            <a:avLst/>
-          </a:prstGeom>
-          <a:ln>
-            <a:noFill/>
-          </a:ln>
-        </p:spPr>
-      </p:pic>
+        </p:nvSpPr>
+        <p:spPr>
+          <a:xfrm>
+            <a:off x="504000" y="2520000"/>
+            <a:ext cx="8870040" cy="3960000"/>
+          </a:xfrm>
+          <a:prstGeom prst="rect">
+            <a:avLst/>
+          </a:prstGeom>
+        </p:spPr>
+        <p:txBody>
+          <a:bodyPr lIns="0" rIns="0" tIns="0" bIns="0"/>
+          <a:p>
+            <a:pPr>
+              <a:buSzPct val="45000"/>
+              <a:buFont typeface="StarSymbol"/>
+              <a:buChar char=""/>
+            </a:pPr>
+            <a:r>
+              <a:rPr lang="en-CA" sz="2600">
+                <a:latin typeface="Arial"/>
+              </a:rPr>
+              <a:t>Working implementation of the repository side in XQuery 3.0 for eXist</a:t>
+            </a:r>
+            <a:endParaRPr/>
+          </a:p>
+          <a:p>
+            <a:pPr>
+              <a:buSzPct val="45000"/>
+              <a:buFont typeface="StarSymbol"/>
+              <a:buChar char=""/>
+            </a:pPr>
+            <a:r>
+              <a:rPr lang="en-CA" sz="2600">
+                <a:latin typeface="Arial"/>
+              </a:rPr>
+              <a:t>Working XSLT for the human-friendly interface</a:t>
+            </a:r>
+            <a:endParaRPr/>
+          </a:p>
+          <a:p>
+            <a:pPr>
+              <a:buSzPct val="45000"/>
+              <a:buFont typeface="StarSymbol"/>
+              <a:buChar char=""/>
+            </a:pPr>
+            <a:r>
+              <a:rPr lang="en-CA" sz="2600">
+                <a:latin typeface="Arial"/>
+              </a:rPr>
+              <a:t>Complete semi-formal specification for the protocol</a:t>
+            </a:r>
+            <a:endParaRPr/>
+          </a:p>
+          <a:p>
+            <a:pPr>
+              <a:buSzPct val="45000"/>
+              <a:buFont typeface="StarSymbol"/>
+              <a:buChar char=""/>
+            </a:pPr>
+            <a:r>
+              <a:rPr lang="en-CA" sz="2600">
+                <a:latin typeface="Arial"/>
+              </a:rPr>
+              <a:t>BUT no work on a harvester yet.</a:t>
+            </a:r>
+            <a:endParaRPr/>
+          </a:p>
+        </p:txBody>
+      </p:sp>
     </p:spTree>
   </p:cSld>
   <p:timing>
     <p:tnLst>
       <p:par>
-        <p:cTn id="93" dur="indefinite" restart="never" nodeType="tmRoot">
+        <p:cTn id="105" dur="indefinite" restart="never" nodeType="tmRoot">
           <p:childTnLst>
             <p:seq>
-              <p:cTn id="94" nodeType="mainSeq"/>
+              <p:cTn id="106" nodeType="mainSeq"/>
               <p:prevCondLst>
                 <p:cond delay="0" evt="onPrev">
                   <p:tgtEl>
@@ -7113,7 +7003,7 @@
               <a:rPr lang="en-CA" sz="3390">
                 <a:latin typeface="Arial"/>
               </a:rPr>
-              <a:t>The state of play</a:t>
+              <a:t>Changes since last year</a:t>
             </a:r>
             <a:endParaRPr/>
           </a:p>
@@ -7127,8 +7017,8 @@
         </p:nvSpPr>
         <p:spPr>
           <a:xfrm>
-            <a:off x="504000" y="2520000"/>
-            <a:ext cx="8870040" cy="3960000"/>
+            <a:off x="504000" y="2095200"/>
+            <a:ext cx="8870040" cy="4384800"/>
           </a:xfrm>
           <a:prstGeom prst="rect">
             <a:avLst/>
@@ -7146,7 +7036,7 @@
               <a:rPr lang="en-CA" sz="2600">
                 <a:latin typeface="Arial"/>
               </a:rPr>
-              <a:t>Working implementation of the repository side in XQuery 3.0 for eXist</a:t>
+              <a:t>Addition of document type filtering (optional in API)</a:t>
             </a:r>
             <a:endParaRPr/>
           </a:p>
@@ -7160,35 +7050,7 @@
               <a:rPr lang="en-CA" sz="2600">
                 <a:latin typeface="Arial"/>
               </a:rPr>
-              <a:t>Working XSLT for the human-friendly interface</a:t>
-            </a:r>
-            <a:endParaRPr/>
-          </a:p>
-          <a:p>
-            <a:pPr>
-              <a:buSzPct val="45000"/>
-              <a:buFont typeface="StarSymbol"/>
-              <a:buChar char=""/>
-            </a:pPr>
-            <a:r>
-              <a:rPr lang="en-CA" sz="2600">
-                <a:latin typeface="Arial"/>
-              </a:rPr>
-              <a:t>Complete semi-formal specification for the protocol</a:t>
-            </a:r>
-            <a:endParaRPr/>
-          </a:p>
-          <a:p>
-            <a:pPr>
-              <a:buSzPct val="45000"/>
-              <a:buFont typeface="StarSymbol"/>
-              <a:buChar char=""/>
-            </a:pPr>
-            <a:r>
-              <a:rPr lang="en-CA" sz="2600">
-                <a:latin typeface="Arial"/>
-              </a:rPr>
-              <a:t>BUT no work on a harvester yet.</a:t>
+              <a:t>Rewrite of the sample implementation (performance improved over 10-fold)</a:t>
             </a:r>
             <a:endParaRPr/>
           </a:p>
@@ -7199,10 +7061,111 @@
   <p:timing>
     <p:tnLst>
       <p:par>
-        <p:cTn id="95" dur="indefinite" restart="never" nodeType="tmRoot">
+        <p:cTn id="107" dur="indefinite" restart="never" nodeType="tmRoot">
           <p:childTnLst>
             <p:seq>
-              <p:cTn id="96" nodeType="mainSeq"/>
+              <p:cTn id="108" nodeType="mainSeq">
+                <p:childTnLst>
+                  <p:par>
+                    <p:cTn id="109" fill="freeze">
+                      <p:stCondLst>
+                        <p:cond delay="indefinite"/>
+                      </p:stCondLst>
+                      <p:childTnLst>
+                        <p:par>
+                          <p:cTn id="110" fill="freeze">
+                            <p:stCondLst>
+                              <p:cond delay="0"/>
+                            </p:stCondLst>
+                            <p:childTnLst>
+                              <p:par>
+                                <p:cTn id="111" nodeType="clickEffect" fill="hold" presetClass="entr" presetID="1">
+                                  <p:stCondLst>
+                                    <p:cond delay="0"/>
+                                  </p:stCondLst>
+                                  <p:childTnLst>
+                                    <p:set>
+                                      <p:cBhvr>
+                                        <p:cTn id="112" dur="1" fill="hold">
+                                          <p:stCondLst>
+                                            <p:cond delay="0"/>
+                                          </p:stCondLst>
+                                        </p:cTn>
+                                        <p:tgtEl>
+                                          <p:spTgt spid="148">
+                                            <p:txEl>
+                                              <p:pRg st="0" end="54"/>
+                                            </p:txEl>
+                                          </p:spTgt>
+                                        </p:tgtEl>
+                                        <p:attrNameLst>
+                                          <p:attrName>style.visibility</p:attrName>
+                                        </p:attrNameLst>
+                                      </p:cBhvr>
+                                      <p:to>
+                                        <p:strVal val="visible"/>
+                                      </p:to>
+                                    </p:set>
+                                  </p:childTnLst>
+                                </p:cTn>
+                              </p:par>
+                            </p:childTnLst>
+                          </p:cTn>
+                        </p:par>
+                      </p:childTnLst>
+                    </p:cTn>
+                  </p:par>
+                  <p:par>
+                    <p:cTn id="113" fill="freeze">
+                      <p:stCondLst>
+                        <p:cond delay="indefinite"/>
+                      </p:stCondLst>
+                      <p:childTnLst>
+                        <p:par>
+                          <p:cTn id="114" fill="freeze">
+                            <p:stCondLst>
+                              <p:cond delay="0"/>
+                            </p:stCondLst>
+                            <p:childTnLst>
+                              <p:par>
+                                <p:cTn id="115" nodeType="clickEffect" fill="hold" presetClass="entr" presetID="1">
+                                  <p:stCondLst>
+                                    <p:cond delay="0"/>
+                                  </p:stCondLst>
+                                  <p:childTnLst>
+                                    <p:set>
+                                      <p:cBhvr>
+                                        <p:cTn id="116" dur="1" fill="hold">
+                                          <p:stCondLst>
+                                            <p:cond delay="0"/>
+                                          </p:stCondLst>
+                                        </p:cTn>
+                                        <p:tgtEl>
+                                          <p:spTgt spid="148">
+                                            <p:txEl>
+                                              <p:pRg st="54" end="127"/>
+                                            </p:txEl>
+                                          </p:spTgt>
+                                        </p:tgtEl>
+                                        <p:attrNameLst>
+                                          <p:attrName>style.visibility</p:attrName>
+                                        </p:attrNameLst>
+                                      </p:cBhvr>
+                                      <p:to>
+                                        <p:strVal val="visible"/>
+                                      </p:to>
+                                    </p:set>
+                                  </p:childTnLst>
+                                </p:cTn>
+                              </p:par>
+                            </p:childTnLst>
+                          </p:cTn>
+                        </p:par>
+                      </p:childTnLst>
+                    </p:cTn>
+                  </p:par>
+                </p:childTnLst>
+              </p:cTn>
               <p:prevCondLst>
                 <p:cond delay="0" evt="onPrev">
                   <p:tgtEl>
@@ -7265,7 +7228,7 @@
               <a:rPr lang="en-CA" sz="3390">
                 <a:latin typeface="Arial"/>
               </a:rPr>
-              <a:t>Changes since last year</a:t>
+              <a:t>The future: implementation</a:t>
             </a:r>
             <a:endParaRPr/>
           </a:p>
@@ -7298,7 +7261,7 @@
               <a:rPr lang="en-CA" sz="2600">
                 <a:latin typeface="Arial"/>
               </a:rPr>
-              <a:t>Addition of document type filtering (optional in API)</a:t>
+              <a:t>Implementations in more projects using eXist.</a:t>
             </a:r>
             <a:endParaRPr/>
           </a:p>
@@ -7312,7 +7275,77 @@
               <a:rPr lang="en-CA" sz="2600">
                 <a:latin typeface="Arial"/>
               </a:rPr>
-              <a:t>Rewrite of the sample implementation (performance improved over 10-fold)</a:t>
+              <a:t>Creation of a plugin version for eXist?</a:t>
+            </a:r>
+            <a:endParaRPr/>
+          </a:p>
+          <a:p>
+            <a:pPr>
+              <a:buSzPct val="45000"/>
+              <a:buFont typeface="StarSymbol"/>
+              <a:buChar char=""/>
+            </a:pPr>
+            <a:r>
+              <a:rPr lang="en-CA" sz="2600">
+                <a:latin typeface="Arial"/>
+              </a:rPr>
+              <a:t>Listing of projects providing CodeSharing on the TEI wiki.</a:t>
+            </a:r>
+            <a:endParaRPr/>
+          </a:p>
+          <a:p>
+            <a:pPr>
+              <a:buSzPct val="45000"/>
+              <a:buFont typeface="StarSymbol"/>
+              <a:buChar char=""/>
+            </a:pPr>
+            <a:r>
+              <a:rPr lang="en-CA" sz="2600">
+                <a:latin typeface="Arial"/>
+              </a:rPr>
+              <a:t>Ports to other frameworks (BaseX; pure Saxon XSLT; PHP with Zorba...).</a:t>
+            </a:r>
+            <a:endParaRPr/>
+          </a:p>
+          <a:p>
+            <a:pPr>
+              <a:buSzPct val="45000"/>
+              <a:buFont typeface="StarSymbol"/>
+              <a:buChar char=""/>
+            </a:pPr>
+            <a:r>
+              <a:rPr lang="en-CA" sz="2600">
+                <a:latin typeface="Arial"/>
+              </a:rPr>
+              <a:t>Creation of a harvester application.</a:t>
+            </a:r>
+            <a:endParaRPr/>
+          </a:p>
+          <a:p>
+            <a:pPr>
+              <a:buSzPct val="45000"/>
+              <a:buFont typeface="StarSymbol"/>
+              <a:buChar char=""/>
+            </a:pPr>
+            <a:r>
+              <a:rPr lang="en-CA" sz="2600">
+                <a:latin typeface="Arial"/>
+              </a:rPr>
+              <a:t>Response compression?</a:t>
+            </a:r>
+            <a:endParaRPr/>
+          </a:p>
+          <a:p>
+            <a:pPr>
+              <a:buSzPct val="45000"/>
+              <a:buFont typeface="StarSymbol"/>
+              <a:buChar char=""/>
+            </a:pPr>
+            <a:r>
+              <a:rPr lang="en-CA" sz="2600">
+                <a:latin typeface="Arial"/>
+              </a:rPr>
+              <a:t>XPath support?</a:t>
             </a:r>
             <a:endParaRPr/>
           </a:p>
@@ -7323,10 +7356,10 @@
   <p:timing>
     <p:tnLst>
       <p:par>
-        <p:cTn id="97" dur="indefinite" restart="never" nodeType="tmRoot">
+        <p:cTn id="117" dur="indefinite" restart="never" nodeType="tmRoot">
           <p:childTnLst>
             <p:seq>
-              <p:cTn id="98" nodeType="mainSeq"/>
+              <p:cTn id="118" nodeType="mainSeq"/>
               <p:prevCondLst>
                 <p:cond delay="0" evt="onPrev">
                   <p:tgtEl>
@@ -7389,7 +7422,7 @@
               <a:rPr lang="en-CA" sz="3390">
                 <a:latin typeface="Arial"/>
               </a:rPr>
-              <a:t>The future: implementation</a:t>
+              <a:t>Where to find it</a:t>
             </a:r>
             <a:endParaRPr/>
           </a:p>
@@ -7403,8 +7436,8 @@
         </p:nvSpPr>
         <p:spPr>
           <a:xfrm>
-            <a:off x="504000" y="2095200"/>
-            <a:ext cx="8870040" cy="4384800"/>
+            <a:off x="504000" y="1944000"/>
+            <a:ext cx="8870040" cy="4536000"/>
           </a:xfrm>
           <a:prstGeom prst="rect">
             <a:avLst/>
@@ -7422,7 +7455,14 @@
               <a:rPr lang="en-CA" sz="2600">
                 <a:latin typeface="Arial"/>
               </a:rPr>
-              <a:t>Implementations in more projects using eXist.</a:t>
+              <a:t>Current specification:</a:t>
+            </a:r>
+            <a:r>
+              <a:rPr lang="en-CA" sz="2600">
+                <a:latin typeface="Arial"/>
+              </a:rPr>
+              <a:t>
+</a:t>
             </a:r>
             <a:endParaRPr/>
           </a:p>
@@ -7436,7 +7476,14 @@
               <a:rPr lang="en-CA" sz="2600">
                 <a:latin typeface="Arial"/>
               </a:rPr>
-              <a:t>Creation of a plugin version for eXist?</a:t>
+              <a:t>SourceForge repo:</a:t>
+            </a:r>
+            <a:r>
+              <a:rPr lang="en-CA" sz="2600">
+                <a:latin typeface="Arial"/>
+              </a:rPr>
+              <a:t>
+</a:t>
             </a:r>
             <a:endParaRPr/>
           </a:p>
@@ -7450,7 +7497,14 @@
               <a:rPr lang="en-CA" sz="2600">
                 <a:latin typeface="Arial"/>
               </a:rPr>
-              <a:t>Listing of projects providing CodeSharing on the TEI wiki.</a:t>
+              <a:t>Sample implementation (XML):</a:t>
+            </a:r>
+            <a:r>
+              <a:rPr lang="en-CA" sz="2600">
+                <a:latin typeface="Arial"/>
+              </a:rPr>
+              <a:t>
+</a:t>
             </a:r>
             <a:endParaRPr/>
           </a:p>
@@ -7464,7 +7518,14 @@
               <a:rPr lang="en-CA" sz="2600">
                 <a:latin typeface="Arial"/>
               </a:rPr>
-              <a:t>Ports to other frameworks (BaseX; pure Saxon XSLT; PHP with Zorba...).</a:t>
+              <a:t>Sample implementation (human-friendly interface):</a:t>
+            </a:r>
+            <a:r>
+              <a:rPr lang="en-CA" sz="2600">
+                <a:latin typeface="Arial"/>
+              </a:rPr>
+              <a:t>
+</a:t>
             </a:r>
             <a:endParaRPr/>
           </a:p>
@@ -7478,35 +7539,7 @@
               <a:rPr lang="en-CA" sz="2600">
                 <a:latin typeface="Arial"/>
               </a:rPr>
-              <a:t>Creation of a harvester application.</a:t>
-            </a:r>
-            <a:endParaRPr/>
-          </a:p>
-          <a:p>
-            <a:pPr>
-              <a:buSzPct val="45000"/>
-              <a:buFont typeface="StarSymbol"/>
-              <a:buChar char=""/>
-            </a:pPr>
-            <a:r>
-              <a:rPr lang="en-CA" sz="2600">
-                <a:latin typeface="Arial"/>
-              </a:rPr>
-              <a:t>Response compression?</a:t>
-            </a:r>
-            <a:endParaRPr/>
-          </a:p>
-          <a:p>
-            <a:pPr>
-              <a:buSzPct val="45000"/>
-              <a:buFont typeface="StarSymbol"/>
-              <a:buChar char=""/>
-            </a:pPr>
-            <a:r>
-              <a:rPr lang="en-CA" sz="2600">
-                <a:latin typeface="Arial"/>
-              </a:rPr>
-              <a:t>XPath support?</a:t>
+              <a:t>Calling potential collaborators!</a:t>
             </a:r>
             <a:endParaRPr/>
           </a:p>
@@ -7517,185 +7550,40 @@
   <p:timing>
     <p:tnLst>
       <p:par>
-        <p:cTn id="99" dur="indefinite" restart="never" nodeType="tmRoot">
+        <p:cTn id="119" dur="indefinite" restart="never" nodeType="tmRoot">
           <p:childTnLst>
             <p:seq>
-              <p:cTn id="100" nodeType="mainSeq"/>
-              <p:prevCondLst>
-                <p:cond delay="0" evt="onPrev">
-                  <p:tgtEl>
-                    <p:sldTgt/>
-                  </p:tgtEl>
-                </p:cond>
-              </p:prevCondLst>
-              <p:nextCondLst>
-                <p:cond delay="0" evt="onNext">
-                  <p:tgtEl>
-                    <p:sldTgt/>
-                  </p:tgtEl>
-                </p:cond>
-              </p:nextCondLst>
-            </p:seq>
-          </p:childTnLst>
-        </p:cTn>
-      </p:par>
-    </p:tnLst>
-  </p:timing>
-</p:sld>
-</file>
-
-<file path=ppt/slides/slide35.xml><?xml version="1.0" encoding="utf-8"?>
-<p:sld xmlns:a="http://schemas.openxmlformats.org/drawingml/2006/main" xmlns:p="http://schemas.openxmlformats.org/presentationml/2006/main" xmlns:r="http://schemas.openxmlformats.org/officeDocument/2006/relationships">
-  <p:cSld>
-    <p:spTree>
-      <p:nvGrpSpPr>
-        <p:cNvPr id="1" name=""/>
-        <p:cNvGrpSpPr/>
-        <p:nvPr/>
-      </p:nvGrpSpPr>
-      <p:grpSpPr>
-        <a:xfrm>
-          <a:off x="0" y="0"/>
-          <a:ext cx="0" cy="0"/>
-          <a:chOff x="0" y="0"/>
-          <a:chExt cx="0" cy="0"/>
-        </a:xfrm>
-      </p:grpSpPr>
-      <p:sp>
-        <p:nvSpPr>
-          <p:cNvPr id="153" name="TextShape 1"/>
-          <p:cNvSpPr txBox="1"/>
-          <p:nvPr/>
-        </p:nvSpPr>
-        <p:spPr>
-          <a:xfrm>
-            <a:off x="432000" y="648000"/>
-            <a:ext cx="7056000" cy="648000"/>
-          </a:xfrm>
-          <a:prstGeom prst="rect">
-            <a:avLst/>
-          </a:prstGeom>
-        </p:spPr>
-        <p:txBody>
-          <a:bodyPr lIns="0" rIns="0" tIns="0" bIns="0" anchor="ctr"/>
-          <a:p>
-            <a:r>
-              <a:rPr lang="en-CA" sz="3390">
-                <a:latin typeface="Arial"/>
-              </a:rPr>
-              <a:t>Where to find it</a:t>
-            </a:r>
-            <a:endParaRPr/>
-          </a:p>
-        </p:txBody>
-      </p:sp>
-      <p:sp>
-        <p:nvSpPr>
-          <p:cNvPr id="154" name="TextShape 2"/>
-          <p:cNvSpPr txBox="1"/>
-          <p:nvPr/>
-        </p:nvSpPr>
-        <p:spPr>
-          <a:xfrm>
-            <a:off x="504000" y="2592000"/>
-            <a:ext cx="8870040" cy="3888000"/>
-          </a:xfrm>
-          <a:prstGeom prst="rect">
-            <a:avLst/>
-          </a:prstGeom>
-        </p:spPr>
-        <p:txBody>
-          <a:bodyPr lIns="0" rIns="0" tIns="0" bIns="0"/>
-          <a:p>
-            <a:pPr>
-              <a:buSzPct val="45000"/>
-              <a:buFont typeface="StarSymbol"/>
-              <a:buChar char=""/>
-            </a:pPr>
-            <a:r>
-              <a:rPr lang="en-CA" sz="2600">
-                <a:latin typeface="Arial"/>
-              </a:rPr>
-              <a:t>Current specification:</a:t>
-            </a:r>
-            <a:endParaRPr/>
-          </a:p>
-          <a:p>
-            <a:pPr>
-              <a:buSzPct val="45000"/>
-              <a:buFont typeface="StarSymbol"/>
-              <a:buChar char=""/>
-            </a:pPr>
-            <a:r>
-              <a:rPr lang="en-CA" sz="2600">
-                <a:latin typeface="Arial"/>
-              </a:rPr>
-              <a:t>SourceForge repo:</a:t>
-            </a:r>
-            <a:r>
-              <a:rPr lang="en-CA" sz="2600">
-                <a:latin typeface="Arial"/>
-              </a:rPr>
-              <a:t>
-</a:t>
-            </a:r>
-            <a:endParaRPr/>
-          </a:p>
-          <a:p>
-            <a:pPr>
-              <a:buSzPct val="45000"/>
-              <a:buFont typeface="StarSymbol"/>
-              <a:buChar char=""/>
-            </a:pPr>
-            <a:r>
-              <a:rPr lang="en-CA" sz="2600">
-                <a:latin typeface="Arial"/>
-              </a:rPr>
-              <a:t>Calling potential collaborators!</a:t>
-            </a:r>
-            <a:endParaRPr/>
-          </a:p>
-        </p:txBody>
-      </p:sp>
-    </p:spTree>
-  </p:cSld>
-  <p:timing>
-    <p:tnLst>
-      <p:par>
-        <p:cTn id="101" dur="indefinite" restart="never" nodeType="tmRoot">
-          <p:childTnLst>
-            <p:seq>
-              <p:cTn id="102" nodeType="mainSeq">
+              <p:cTn id="120" nodeType="mainSeq">
                 <p:childTnLst>
                   <p:par>
-                    <p:cTn id="103" fill="freeze">
+                    <p:cTn id="121" fill="freeze">
                       <p:stCondLst>
                         <p:cond delay="indefinite"/>
                       </p:stCondLst>
                       <p:childTnLst>
                         <p:par>
-                          <p:cTn id="104" fill="freeze">
+                          <p:cTn id="122" fill="freeze">
                             <p:stCondLst>
                               <p:cond delay="0"/>
                             </p:stCondLst>
                             <p:childTnLst>
                               <p:par>
-                                <p:cTn id="105" nodeType="clickEffect" fill="hold" presetClass="entr" presetID="1">
+                                <p:cTn id="123" nodeType="clickEffect" fill="hold" presetClass="entr" presetID="1">
                                   <p:stCondLst>
                                     <p:cond delay="0"/>
                                   </p:stCondLst>
                                   <p:childTnLst>
                                     <p:set>
                                       <p:cBhvr>
-                                        <p:cTn id="106" dur="1" fill="hold">
+                                        <p:cTn id="124" dur="1" fill="hold">
                                           <p:stCondLst>
                                             <p:cond delay="0"/>
                                           </p:stCondLst>
                                         </p:cTn>
                                         <p:tgtEl>
-                                          <p:spTgt spid="154">
+                                          <p:spTgt spid="152">
                                             <p:txEl>
-                                              <p:pRg st="0" end="23"/>
+                                              <p:pRg st="0" end="24"/>
                                             </p:txEl>
                                           </p:spTgt>
                                         </p:tgtEl>
@@ -7717,34 +7605,181 @@
                     </p:cTn>
                   </p:par>
                   <p:par>
-                    <p:cTn id="107" fill="freeze">
+                    <p:cTn id="125" fill="freeze">
                       <p:stCondLst>
                         <p:cond delay="indefinite"/>
                       </p:stCondLst>
                       <p:childTnLst>
                         <p:par>
-                          <p:cTn id="108" fill="freeze">
+                          <p:cTn id="126" fill="freeze">
                             <p:stCondLst>
                               <p:cond delay="0"/>
                             </p:stCondLst>
                             <p:childTnLst>
                               <p:par>
-                                <p:cTn id="109" nodeType="clickEffect" fill="hold" presetClass="entr" presetID="1">
+                                <p:cTn id="127" nodeType="clickEffect" fill="hold" presetClass="entr" presetID="1">
                                   <p:stCondLst>
                                     <p:cond delay="0"/>
                                   </p:stCondLst>
                                   <p:childTnLst>
                                     <p:set>
                                       <p:cBhvr>
-                                        <p:cTn id="110" dur="1" fill="hold">
+                                        <p:cTn id="128" dur="1" fill="hold">
                                           <p:stCondLst>
                                             <p:cond delay="0"/>
                                           </p:stCondLst>
                                         </p:cTn>
                                         <p:tgtEl>
-                                          <p:spTgt spid="154">
+                                          <p:spTgt spid="152">
                                             <p:txEl>
-                                              <p:pRg st="23" end="42"/>
+                                              <p:pRg st="24" end="43"/>
+                                            </p:txEl>
+                                          </p:spTgt>
+                                        </p:tgtEl>
+                                        <p:attrNameLst>
+                                          <p:attrName>style.visibility</p:attrName>
+                                        </p:attrNameLst>
+                                      </p:cBhvr>
+                                      <p:to>
+                                        <p:strVal val="visible"/>
+                                      </p:to>
+                                    </p:set>
+                                  </p:childTnLst>
+                                </p:cTn>
+                              </p:par>
+                            </p:childTnLst>
+                          </p:cTn>
+                        </p:par>
+                      </p:childTnLst>
+                    </p:cTn>
+                  </p:par>
+                  <p:par>
+                    <p:cTn id="129" fill="freeze">
+                      <p:stCondLst>
+                        <p:cond delay="indefinite"/>
+                      </p:stCondLst>
+                      <p:childTnLst>
+                        <p:par>
+                          <p:cTn id="130" fill="freeze">
+                            <p:stCondLst>
+                              <p:cond delay="0"/>
+                            </p:stCondLst>
+                            <p:childTnLst>
+                              <p:par>
+                                <p:cTn id="131" nodeType="clickEffect" fill="hold" presetClass="entr" presetID="1">
+                                  <p:stCondLst>
+                                    <p:cond delay="0"/>
+                                  </p:stCondLst>
+                                  <p:childTnLst>
+                                    <p:set>
+                                      <p:cBhvr>
+                                        <p:cTn id="132" dur="1" fill="hold">
+                                          <p:stCondLst>
+                                            <p:cond delay="0"/>
+                                          </p:stCondLst>
+                                        </p:cTn>
+                                        <p:tgtEl>
+                                          <p:spTgt spid="152">
+                                            <p:txEl>
+                                              <p:pRg st="43" end="73"/>
+                                            </p:txEl>
+                                          </p:spTgt>
+                                        </p:tgtEl>
+                                        <p:attrNameLst>
+                                          <p:attrName>style.visibility</p:attrName>
+                                        </p:attrNameLst>
+                                      </p:cBhvr>
+                                      <p:to>
+                                        <p:strVal val="visible"/>
+                                      </p:to>
+                                    </p:set>
+                                  </p:childTnLst>
+                                </p:cTn>
+                              </p:par>
+                            </p:childTnLst>
+                          </p:cTn>
+                        </p:par>
+                      </p:childTnLst>
+                    </p:cTn>
+                  </p:par>
+                  <p:par>
+                    <p:cTn id="133" fill="freeze">
+                      <p:stCondLst>
+                        <p:cond delay="indefinite"/>
+                      </p:stCondLst>
+                      <p:childTnLst>
+                        <p:par>
+                          <p:cTn id="134" fill="freeze">
+                            <p:stCondLst>
+                              <p:cond delay="0"/>
+                            </p:stCondLst>
+                            <p:childTnLst>
+                              <p:par>
+                                <p:cTn id="135" nodeType="clickEffect" fill="hold" presetClass="entr" presetID="1">
+                                  <p:stCondLst>
+                                    <p:cond delay="0"/>
+                                  </p:stCondLst>
+                                  <p:childTnLst>
+                                    <p:set>
+                                      <p:cBhvr>
+                                        <p:cTn id="136" dur="1" fill="hold">
+                                          <p:stCondLst>
+                                            <p:cond delay="0"/>
+                                          </p:stCondLst>
+                                        </p:cTn>
+                                        <p:tgtEl>
+                                          <p:spTgt spid="152">
+                                            <p:txEl>
+                                              <p:pRg st="73" end="124"/>
+                                            </p:txEl>
+                                          </p:spTgt>
+                                        </p:tgtEl>
+                                        <p:attrNameLst>
+                                          <p:attrName>style.visibility</p:attrName>
+                                        </p:attrNameLst>
+                                      </p:cBhvr>
+                                      <p:to>
+                                        <p:strVal val="visible"/>
+                                      </p:to>
+                                    </p:set>
+                                  </p:childTnLst>
+                                </p:cTn>
+                              </p:par>
+                            </p:childTnLst>
+                          </p:cTn>
+                        </p:par>
+                      </p:childTnLst>
+                    </p:cTn>
+                  </p:par>
+                  <p:par>
+                    <p:cTn id="137" fill="freeze">
+                      <p:stCondLst>
+                        <p:cond delay="indefinite"/>
+                      </p:stCondLst>
+                      <p:childTnLst>
+                        <p:par>
+                          <p:cTn id="138" fill="freeze">
+                            <p:stCondLst>
+                              <p:cond delay="0"/>
+                            </p:stCondLst>
+                            <p:childTnLst>
+                              <p:par>
+                                <p:cTn id="139" nodeType="clickEffect" fill="hold" presetClass="entr" presetID="1">
+                                  <p:stCondLst>
+                                    <p:cond delay="0"/>
+                                  </p:stCondLst>
+                                  <p:childTnLst>
+                                    <p:set>
+                                      <p:cBhvr>
+                                        <p:cTn id="140" dur="1" fill="hold">
+                                          <p:stCondLst>
+                                            <p:cond delay="0"/>
+                                          </p:stCondLst>
+                                        </p:cTn>
+                                        <p:tgtEl>
+                                          <p:spTgt spid="152">
+                                            <p:txEl>
+                                              <p:pRg st="124" end="157"/>
                                             </p:txEl>
                                           </p:spTgt>
                                         </p:tgtEl>
@@ -7954,32 +7989,32 @@
   <p:timing>
     <p:tnLst>
       <p:par>
-        <p:cTn id="11" dur="indefinite" restart="never" nodeType="tmRoot">
+        <p:cTn id="31" dur="indefinite" restart="never" nodeType="tmRoot">
           <p:childTnLst>
             <p:seq>
-              <p:cTn id="12" nodeType="mainSeq">
+              <p:cTn id="32" nodeType="mainSeq">
                 <p:childTnLst>
                   <p:par>
-                    <p:cTn id="13" fill="freeze">
+                    <p:cTn id="33" fill="freeze">
                       <p:stCondLst>
                         <p:cond delay="indefinite"/>
                       </p:stCondLst>
                       <p:childTnLst>
                         <p:par>
-                          <p:cTn id="14" fill="freeze">
+                          <p:cTn id="34" fill="freeze">
                             <p:stCondLst>
                               <p:cond delay="0"/>
                             </p:stCondLst>
                             <p:childTnLst>
                               <p:par>
-                                <p:cTn id="15" nodeType="clickEffect" fill="hold" presetClass="entr" presetID="1">
+                                <p:cTn id="35" nodeType="clickEffect" fill="hold" presetClass="entr" presetID="1">
                                   <p:stCondLst>
                                     <p:cond delay="0"/>
                                   </p:stCondLst>
                                   <p:childTnLst>
                                     <p:set>
                                       <p:cBhvr>
-                                        <p:cTn id="16" dur="1" fill="hold">
+                                        <p:cTn id="36" dur="1" fill="hold">
                                           <p:stCondLst>
                                             <p:cond delay="0"/>
                                           </p:stCondLst>
@@ -8009,26 +8044,26 @@
                     </p:cTn>
                   </p:par>
                   <p:par>
-                    <p:cTn id="17" fill="freeze">
+                    <p:cTn id="37" fill="freeze">
                       <p:stCondLst>
                         <p:cond delay="indefinite"/>
                       </p:stCondLst>
                       <p:childTnLst>
                         <p:par>
-                          <p:cTn id="18" fill="freeze">
+                          <p:cTn id="38" fill="freeze">
                             <p:stCondLst>
                               <p:cond delay="0"/>
                             </p:stCondLst>
                             <p:childTnLst>
                               <p:par>
-                                <p:cTn id="19" nodeType="clickEffect" fill="hold" presetClass="entr" presetID="1">
+                                <p:cTn id="39" nodeType="clickEffect" fill="hold" presetClass="entr" presetID="1">
                                   <p:stCondLst>
                                     <p:cond delay="0"/>
                                   </p:stCondLst>
                                   <p:childTnLst>
                                     <p:set>
                                       <p:cBhvr>
-                                        <p:cTn id="20" dur="1" fill="hold">
+                                        <p:cTn id="40" dur="1" fill="hold">
                                           <p:stCondLst>
                                             <p:cond delay="0"/>
                                           </p:stCondLst>
@@ -8058,26 +8093,26 @@
                     </p:cTn>
                   </p:par>
                   <p:par>
-                    <p:cTn id="21" fill="freeze">
+                    <p:cTn id="41" fill="freeze">
                       <p:stCondLst>
                         <p:cond delay="indefinite"/>
                       </p:stCondLst>
                       <p:childTnLst>
                         <p:par>
-                          <p:cTn id="22" fill="freeze">
+                          <p:cTn id="42" fill="freeze">
                             <p:stCondLst>
                               <p:cond delay="0"/>
                             </p:stCondLst>
                             <p:childTnLst>
                               <p:par>
-                                <p:cTn id="23" nodeType="clickEffect" fill="hold" presetClass="entr" presetID="1">
+                                <p:cTn id="43" nodeType="clickEffect" fill="hold" presetClass="entr" presetID="1">
                                   <p:stCondLst>
                                     <p:cond delay="0"/>
                                   </p:stCondLst>
                                   <p:childTnLst>
                                     <p:set>
                                       <p:cBhvr>
-                                        <p:cTn id="24" dur="1" fill="hold">
+                                        <p:cTn id="44" dur="1" fill="hold">
                                           <p:stCondLst>
                                             <p:cond delay="0"/>
                                           </p:stCondLst>
@@ -8270,10 +8305,10 @@
   <p:timing>
     <p:tnLst>
       <p:par>
-        <p:cTn id="25" dur="indefinite" restart="never" nodeType="tmRoot">
+        <p:cTn id="45" dur="indefinite" restart="never" nodeType="tmRoot">
           <p:childTnLst>
             <p:seq>
-              <p:cTn id="26" nodeType="mainSeq"/>
+              <p:cTn id="46" nodeType="mainSeq"/>
               <p:prevCondLst>
                 <p:cond delay="0" evt="onPrev">
                   <p:tgtEl>
@@ -8422,10 +8457,10 @@
   <p:timing>
     <p:tnLst>
       <p:par>
-        <p:cTn id="27" dur="indefinite" restart="never" nodeType="tmRoot">
+        <p:cTn id="47" dur="indefinite" restart="never" nodeType="tmRoot">
           <p:childTnLst>
             <p:seq>
-              <p:cTn id="28" nodeType="mainSeq"/>
+              <p:cTn id="48" nodeType="mainSeq"/>
               <p:prevCondLst>
                 <p:cond delay="0" evt="onPrev">
                   <p:tgtEl>
@@ -8615,10 +8650,111 @@
   <p:timing>
     <p:tnLst>
       <p:par>
-        <p:cTn id="29" dur="indefinite" restart="never" nodeType="tmRoot">
+        <p:cTn id="49" dur="indefinite" restart="never" nodeType="tmRoot">
           <p:childTnLst>
             <p:seq>
-              <p:cTn id="30" nodeType="mainSeq"/>
+              <p:cTn id="50" nodeType="mainSeq">
+                <p:childTnLst>
+                  <p:par>
+                    <p:cTn id="51" fill="freeze">
+                      <p:stCondLst>
+                        <p:cond delay="indefinite"/>
+                      </p:stCondLst>
+                      <p:childTnLst>
+                        <p:par>
+                          <p:cTn id="52" fill="freeze">
+                            <p:stCondLst>
+                              <p:cond delay="0"/>
+                            </p:stCondLst>
+                            <p:childTnLst>
+                              <p:par>
+                                <p:cTn id="53" nodeType="clickEffect" fill="hold" presetClass="entr" presetID="1">
+                                  <p:stCondLst>
+                                    <p:cond delay="0"/>
+                                  </p:stCondLst>
+                                  <p:childTnLst>
+                                    <p:set>
+                                      <p:cBhvr>
+                                        <p:cTn id="54" dur="1" fill="hold">
+                                          <p:stCondLst>
+                                            <p:cond delay="0"/>
+                                          </p:stCondLst>
+                                        </p:cTn>
+                                        <p:tgtEl>
+                                          <p:spTgt spid="97">
+                                            <p:txEl>
+                                              <p:pRg st="364" end="385"/>
+                                            </p:txEl>
+                                          </p:spTgt>
+                                        </p:tgtEl>
+                                        <p:attrNameLst>
+                                          <p:attrName>style.visibility</p:attrName>
+                                        </p:attrNameLst>
+                                      </p:cBhvr>
+                                      <p:to>
+                                        <p:strVal val="visible"/>
+                                      </p:to>
+                                    </p:set>
+                                  </p:childTnLst>
+                                </p:cTn>
+                              </p:par>
+                            </p:childTnLst>
+                          </p:cTn>
+                        </p:par>
+                      </p:childTnLst>
+                    </p:cTn>
+                  </p:par>
+                  <p:par>
+                    <p:cTn id="55" fill="freeze">
+                      <p:stCondLst>
+                        <p:cond delay="indefinite"/>
+                      </p:stCondLst>
+                      <p:childTnLst>
+                        <p:par>
+                          <p:cTn id="56" fill="freeze">
+                            <p:stCondLst>
+                              <p:cond delay="0"/>
+                            </p:stCondLst>
+                            <p:childTnLst>
+                              <p:par>
+                                <p:cTn id="57" nodeType="clickEffect" fill="hold" presetClass="entr" presetID="1">
+                                  <p:stCondLst>
+                                    <p:cond delay="0"/>
+                                  </p:stCondLst>
+                                  <p:childTnLst>
+                                    <p:set>
+                                      <p:cBhvr>
+                                        <p:cTn id="58" dur="1" fill="hold">
+                                          <p:stCondLst>
+                                            <p:cond delay="0"/>
+                                          </p:stCondLst>
+                                        </p:cTn>
+                                        <p:tgtEl>
+                                          <p:spTgt spid="97">
+                                            <p:txEl>
+                                              <p:pRg st="385" end="412"/>
+                                            </p:txEl>
+                                          </p:spTgt>
+                                        </p:tgtEl>
+                                        <p:attrNameLst>
+                                          <p:attrName>style.visibility</p:attrName>
+                                        </p:attrNameLst>
+                                      </p:cBhvr>
+                                      <p:to>
+                                        <p:strVal val="visible"/>
+                                      </p:to>
+                                    </p:set>
+                                  </p:childTnLst>
+                                </p:cTn>
+                              </p:par>
+                            </p:childTnLst>
+                          </p:cTn>
+                        </p:par>
+                      </p:childTnLst>
+                    </p:cTn>
+                  </p:par>
+                </p:childTnLst>
+              </p:cTn>
               <p:prevCondLst>
                 <p:cond delay="0" evt="onPrev">
                   <p:tgtEl>
@@ -8717,10 +8853,10 @@
   <p:timing>
     <p:tnLst>
       <p:par>
-        <p:cTn id="31" dur="indefinite" restart="never" nodeType="tmRoot">
+        <p:cTn id="59" dur="indefinite" restart="never" nodeType="tmRoot">
           <p:childTnLst>
             <p:seq>
-              <p:cTn id="32" nodeType="mainSeq"/>
+              <p:cTn id="60" nodeType="mainSeq"/>
               <p:prevCondLst>
                 <p:cond delay="0" evt="onPrev">
                   <p:tgtEl>
@@ -8819,10 +8955,10 @@
   <p:timing>
     <p:tnLst>
       <p:par>
-        <p:cTn id="33" dur="indefinite" restart="never" nodeType="tmRoot">
+        <p:cTn id="61" dur="indefinite" restart="never" nodeType="tmRoot">
           <p:childTnLst>
             <p:seq>
-              <p:cTn id="34" nodeType="mainSeq"/>
+              <p:cTn id="62" nodeType="mainSeq"/>
               <p:prevCondLst>
                 <p:cond delay="0" evt="onPrev">
                   <p:tgtEl>

</xml_diff>